<commit_message>
manipulation221022sat.pptx と .pdf にExample 5を追加。
</commit_message>
<xml_diff>
--- a/docs2/manipulation221022sat.pptx
+++ b/docs2/manipulation221022sat.pptx
@@ -5,7 +5,7 @@
     <p:sldMasterId id="2147483660" r:id="rId1"/>
   </p:sldMasterIdLst>
   <p:notesMasterIdLst>
-    <p:notesMasterId r:id="rId16"/>
+    <p:notesMasterId r:id="rId17"/>
   </p:notesMasterIdLst>
   <p:sldIdLst>
     <p:sldId id="256" r:id="rId2"/>
@@ -19,9 +19,10 @@
     <p:sldId id="268" r:id="rId10"/>
     <p:sldId id="263" r:id="rId11"/>
     <p:sldId id="264" r:id="rId12"/>
-    <p:sldId id="265" r:id="rId13"/>
-    <p:sldId id="266" r:id="rId14"/>
-    <p:sldId id="267" r:id="rId15"/>
+    <p:sldId id="270" r:id="rId13"/>
+    <p:sldId id="265" r:id="rId14"/>
+    <p:sldId id="266" r:id="rId15"/>
+    <p:sldId id="267" r:id="rId16"/>
   </p:sldIdLst>
   <p:sldSz cx="9144000" cy="6858000" type="screen4x3"/>
   <p:notesSz cx="6858000" cy="9144000"/>
@@ -210,7 +211,7 @@
           <a:p>
             <a:fld id="{0A693C87-55B6-E547-B1A2-F87AD222B059}" type="datetimeFigureOut">
               <a:rPr kumimoji="1" lang="ja-JP" altLang="en-US" smtClean="0"/>
-              <a:t>2022/10/27</a:t>
+              <a:t>2022/11/1</a:t>
             </a:fld>
             <a:endParaRPr kumimoji="1" lang="ja-JP" altLang="en-US"/>
           </a:p>
@@ -724,7 +725,7 @@
           <a:p>
             <a:fld id="{54523C7D-926C-5842-A907-F9DF9CC9C74B}" type="datetime1">
               <a:rPr kumimoji="1" lang="ja-JP" altLang="en-US" smtClean="0"/>
-              <a:t>2022/10/27</a:t>
+              <a:t>2022/11/1</a:t>
             </a:fld>
             <a:endParaRPr kumimoji="1" lang="ja-JP" altLang="en-US"/>
           </a:p>
@@ -926,7 +927,7 @@
           <a:p>
             <a:fld id="{F660F69B-E2BC-8A44-9892-3841B7B35636}" type="datetime1">
               <a:rPr kumimoji="1" lang="ja-JP" altLang="en-US" smtClean="0"/>
-              <a:t>2022/10/27</a:t>
+              <a:t>2022/11/1</a:t>
             </a:fld>
             <a:endParaRPr kumimoji="1" lang="ja-JP" altLang="en-US"/>
           </a:p>
@@ -1138,7 +1139,7 @@
           <a:p>
             <a:fld id="{F9CC5C56-91C2-1345-A478-D7EE41FFB54B}" type="datetime1">
               <a:rPr kumimoji="1" lang="ja-JP" altLang="en-US" smtClean="0"/>
-              <a:t>2022/10/27</a:t>
+              <a:t>2022/11/1</a:t>
             </a:fld>
             <a:endParaRPr kumimoji="1" lang="ja-JP" altLang="en-US"/>
           </a:p>
@@ -1340,7 +1341,7 @@
           <a:p>
             <a:fld id="{8E24D78D-8290-D247-A0A8-AB2DA575E945}" type="datetime1">
               <a:rPr kumimoji="1" lang="ja-JP" altLang="en-US" smtClean="0"/>
-              <a:t>2022/10/27</a:t>
+              <a:t>2022/11/1</a:t>
             </a:fld>
             <a:endParaRPr kumimoji="1" lang="ja-JP" altLang="en-US"/>
           </a:p>
@@ -1584,7 +1585,7 @@
           <a:p>
             <a:fld id="{9391F087-57F1-164D-AC1B-8A8818B3EC34}" type="datetime1">
               <a:rPr kumimoji="1" lang="ja-JP" altLang="en-US" smtClean="0"/>
-              <a:t>2022/10/27</a:t>
+              <a:t>2022/11/1</a:t>
             </a:fld>
             <a:endParaRPr kumimoji="1" lang="ja-JP" altLang="en-US"/>
           </a:p>
@@ -1880,7 +1881,7 @@
           <a:p>
             <a:fld id="{ACA830FA-FA95-684B-BFD0-107F58ACF2A3}" type="datetime1">
               <a:rPr kumimoji="1" lang="ja-JP" altLang="en-US" smtClean="0"/>
-              <a:t>2022/10/27</a:t>
+              <a:t>2022/11/1</a:t>
             </a:fld>
             <a:endParaRPr kumimoji="1" lang="ja-JP" altLang="en-US"/>
           </a:p>
@@ -2311,7 +2312,7 @@
           <a:p>
             <a:fld id="{1255F6B1-9E43-2F48-9DAD-47AE909CC5CD}" type="datetime1">
               <a:rPr kumimoji="1" lang="ja-JP" altLang="en-US" smtClean="0"/>
-              <a:t>2022/10/27</a:t>
+              <a:t>2022/11/1</a:t>
             </a:fld>
             <a:endParaRPr kumimoji="1" lang="ja-JP" altLang="en-US"/>
           </a:p>
@@ -2429,7 +2430,7 @@
           <a:p>
             <a:fld id="{5AF4E35F-B3AF-0B4F-A118-6848492D4CD2}" type="datetime1">
               <a:rPr kumimoji="1" lang="ja-JP" altLang="en-US" smtClean="0"/>
-              <a:t>2022/10/27</a:t>
+              <a:t>2022/11/1</a:t>
             </a:fld>
             <a:endParaRPr kumimoji="1" lang="ja-JP" altLang="en-US"/>
           </a:p>
@@ -2524,7 +2525,7 @@
           <a:p>
             <a:fld id="{9011BBC8-07FC-B848-9C4E-81DE00225A26}" type="datetime1">
               <a:rPr kumimoji="1" lang="ja-JP" altLang="en-US" smtClean="0"/>
-              <a:t>2022/10/27</a:t>
+              <a:t>2022/11/1</a:t>
             </a:fld>
             <a:endParaRPr kumimoji="1" lang="ja-JP" altLang="en-US"/>
           </a:p>
@@ -2833,7 +2834,7 @@
           <a:p>
             <a:fld id="{8AB5527A-2295-D342-A1FA-B269C39CA8E3}" type="datetime1">
               <a:rPr kumimoji="1" lang="ja-JP" altLang="en-US" smtClean="0"/>
-              <a:t>2022/10/27</a:t>
+              <a:t>2022/11/1</a:t>
             </a:fld>
             <a:endParaRPr kumimoji="1" lang="ja-JP" altLang="en-US"/>
           </a:p>
@@ -3090,7 +3091,7 @@
           <a:p>
             <a:fld id="{134EAD79-88D9-5649-BA8D-12C9185BCD5A}" type="datetime1">
               <a:rPr kumimoji="1" lang="ja-JP" altLang="en-US" smtClean="0"/>
-              <a:t>2022/10/27</a:t>
+              <a:t>2022/11/1</a:t>
             </a:fld>
             <a:endParaRPr kumimoji="1" lang="ja-JP" altLang="en-US"/>
           </a:p>
@@ -3335,7 +3336,7 @@
           <a:p>
             <a:fld id="{4F2ACFE4-3DDC-1748-A357-EB2D7D7357CB}" type="datetime1">
               <a:rPr kumimoji="1" lang="ja-JP" altLang="en-US" smtClean="0"/>
-              <a:t>2022/10/27</a:t>
+              <a:t>2022/11/1</a:t>
             </a:fld>
             <a:endParaRPr kumimoji="1" lang="ja-JP" altLang="en-US"/>
           </a:p>
@@ -4255,20 +4256,28 @@
         <p:spPr>
           <a:xfrm>
             <a:off x="628650" y="440032"/>
-            <a:ext cx="7139774" cy="275697"/>
+            <a:ext cx="8066314" cy="275697"/>
           </a:xfrm>
         </p:spPr>
         <p:txBody>
           <a:bodyPr>
-            <a:normAutofit fontScale="90000"/>
+            <a:noAutofit/>
           </a:bodyPr>
           <a:lstStyle/>
           <a:p>
             <a:r>
-              <a:rPr kumimoji="1" lang="en-US" altLang="ja-JP" dirty="0"/>
-              <a:t>Example4.  From a pie chart.</a:t>
-            </a:r>
-            <a:endParaRPr kumimoji="1" lang="ja-JP" altLang="en-US"/>
+              <a:rPr kumimoji="1" lang="en-US" altLang="ja-JP" sz="3600" dirty="0"/>
+              <a:t>Example4.  </a:t>
+            </a:r>
+            <a:r>
+              <a:rPr lang="en-US" altLang="ja-JP" sz="3600" dirty="0"/>
+              <a:t>A</a:t>
+            </a:r>
+            <a:r>
+              <a:rPr kumimoji="1" lang="en-US" altLang="ja-JP" sz="3600" dirty="0"/>
+              <a:t> pie chart (7 divisions)</a:t>
+            </a:r>
+            <a:endParaRPr kumimoji="1" lang="ja-JP" altLang="en-US" sz="3600"/>
           </a:p>
         </p:txBody>
       </p:sp>
@@ -4560,7 +4569,7 @@
           <p:cNvPr id="2" name="タイトル 1">
             <a:extLst>
               <a:ext uri="{FF2B5EF4-FFF2-40B4-BE49-F238E27FC236}">
-                <a16:creationId xmlns:a16="http://schemas.microsoft.com/office/drawing/2014/main" id="{13DB1389-1338-4CB4-559B-886C43B95EA2}"/>
+                <a16:creationId xmlns:a16="http://schemas.microsoft.com/office/drawing/2014/main" id="{B5FB2D0B-43B6-EDB2-ACD3-95B522DBE069}"/>
               </a:ext>
             </a:extLst>
           </p:cNvPr>
@@ -4574,7 +4583,7 @@
         <p:spPr>
           <a:xfrm>
             <a:off x="628650" y="365127"/>
-            <a:ext cx="7886700" cy="684446"/>
+            <a:ext cx="7886700" cy="365126"/>
           </a:xfrm>
         </p:spPr>
         <p:txBody>
@@ -4585,305 +4594,9 @@
           <a:p>
             <a:r>
               <a:rPr kumimoji="1" lang="en-US" altLang="ja-JP" dirty="0"/>
-              <a:t>Various options in rounding </a:t>
+              <a:t>Example 5. A pie chart (8 divisions) </a:t>
             </a:r>
             <a:endParaRPr kumimoji="1" lang="ja-JP" altLang="en-US"/>
-          </a:p>
-        </p:txBody>
-      </p:sp>
-      <p:sp>
-        <p:nvSpPr>
-          <p:cNvPr id="3" name="コンテンツ プレースホルダー 2">
-            <a:extLst>
-              <a:ext uri="{FF2B5EF4-FFF2-40B4-BE49-F238E27FC236}">
-                <a16:creationId xmlns:a16="http://schemas.microsoft.com/office/drawing/2014/main" id="{21155940-76B4-8DC5-C6B6-DBF942B6C899}"/>
-              </a:ext>
-            </a:extLst>
-          </p:cNvPr>
-          <p:cNvSpPr>
-            <a:spLocks noGrp="1"/>
-          </p:cNvSpPr>
-          <p:nvPr>
-            <p:ph idx="1"/>
-          </p:nvPr>
-        </p:nvSpPr>
-        <p:spPr>
-          <a:xfrm>
-            <a:off x="628650" y="1280160"/>
-            <a:ext cx="7886700" cy="4896803"/>
-          </a:xfrm>
-        </p:spPr>
-        <p:txBody>
-          <a:bodyPr>
-            <a:normAutofit/>
-          </a:bodyPr>
-          <a:lstStyle/>
-          <a:p>
-            <a:pPr marL="0" indent="0">
-              <a:buNone/>
-            </a:pPr>
-            <a:r>
-              <a:rPr kumimoji="1" lang="en-US" altLang="ja-JP" sz="3200" dirty="0"/>
-              <a:t>Assuming the rounding</a:t>
-            </a:r>
-          </a:p>
-          <a:p>
-            <a:r>
-              <a:rPr kumimoji="1" lang="en-US" altLang="ja-JP" sz="2400" dirty="0"/>
-              <a:t>“round down” </a:t>
-            </a:r>
-            <a:r>
-              <a:rPr kumimoji="1" lang="en-US" altLang="ja-JP" sz="2000" dirty="0"/>
-              <a:t>(floor ; e.g. 0.345 </a:t>
-            </a:r>
-            <a:r>
-              <a:rPr kumimoji="1" lang="ja-JP" altLang="en-US" sz="2000"/>
-              <a:t>→</a:t>
-            </a:r>
-            <a:r>
-              <a:rPr kumimoji="1" lang="en-US" altLang="ja-JP" sz="2000" dirty="0"/>
-              <a:t> 0.34)</a:t>
-            </a:r>
-            <a:r>
-              <a:rPr kumimoji="1" lang="en-US" altLang="ja-JP" sz="2400" dirty="0"/>
-              <a:t> : </a:t>
-            </a:r>
-            <a:r>
-              <a:rPr kumimoji="1" lang="en-US" altLang="ja-JP" sz="2400" b="1" dirty="0">
-                <a:solidFill>
-                  <a:srgbClr val="0432FF"/>
-                </a:solidFill>
-              </a:rPr>
-              <a:t>–f</a:t>
-            </a:r>
-            <a:r>
-              <a:rPr kumimoji="1" lang="en-US" altLang="ja-JP" sz="2400" dirty="0"/>
-              <a:t> </a:t>
-            </a:r>
-          </a:p>
-          <a:p>
-            <a:r>
-              <a:rPr lang="en-US" altLang="ja-JP" sz="2400" dirty="0"/>
-              <a:t>“round up” </a:t>
-            </a:r>
-            <a:r>
-              <a:rPr lang="en-US" altLang="ja-JP" sz="2000" dirty="0"/>
-              <a:t>(ceil</a:t>
-            </a:r>
-            <a:r>
-              <a:rPr kumimoji="1" lang="en-US" altLang="ja-JP" sz="2000" dirty="0"/>
-              <a:t> ; e.g. 0.345 </a:t>
-            </a:r>
-            <a:r>
-              <a:rPr kumimoji="1" lang="ja-JP" altLang="en-US" sz="2000"/>
-              <a:t>→</a:t>
-            </a:r>
-            <a:r>
-              <a:rPr kumimoji="1" lang="en-US" altLang="ja-JP" sz="2000" dirty="0"/>
-              <a:t> 0.35</a:t>
-            </a:r>
-            <a:r>
-              <a:rPr lang="en-US" altLang="ja-JP" sz="2000" dirty="0"/>
-              <a:t>)</a:t>
-            </a:r>
-            <a:r>
-              <a:rPr lang="en-US" altLang="ja-JP" sz="2400" dirty="0"/>
-              <a:t> : </a:t>
-            </a:r>
-            <a:r>
-              <a:rPr lang="en-US" altLang="ja-JP" sz="2400" b="1" dirty="0">
-                <a:solidFill>
-                  <a:srgbClr val="0432FF"/>
-                </a:solidFill>
-              </a:rPr>
-              <a:t>–c</a:t>
-            </a:r>
-            <a:r>
-              <a:rPr lang="en-US" altLang="ja-JP" sz="2400" dirty="0"/>
-              <a:t> </a:t>
-            </a:r>
-          </a:p>
-          <a:p>
-            <a:r>
-              <a:rPr lang="en-US" altLang="ja-JP" sz="2400" dirty="0"/>
-              <a:t>“round half up” is done twice </a:t>
-            </a:r>
-            <a:r>
-              <a:rPr lang="en-US" altLang="ja-JP" sz="2000" dirty="0"/>
-              <a:t>( </a:t>
-            </a:r>
-            <a:r>
-              <a:rPr lang="en-US" altLang="ja-JP" sz="2000" i="1" dirty="0"/>
-              <a:t>e.g.</a:t>
-            </a:r>
-            <a:r>
-              <a:rPr lang="en-US" altLang="ja-JP" sz="2000" dirty="0"/>
-              <a:t> 0.345</a:t>
-            </a:r>
-            <a:r>
-              <a:rPr lang="ja-JP" altLang="en-US" sz="2000"/>
-              <a:t>→</a:t>
-            </a:r>
-            <a:r>
-              <a:rPr lang="en-US" altLang="ja-JP" sz="2000" dirty="0"/>
-              <a:t>0.35</a:t>
-            </a:r>
-            <a:r>
-              <a:rPr lang="ja-JP" altLang="en-US" sz="2000"/>
-              <a:t>→</a:t>
-            </a:r>
-            <a:r>
-              <a:rPr lang="en-US" altLang="ja-JP" sz="2000" dirty="0"/>
-              <a:t>0.4 ) </a:t>
-            </a:r>
-            <a:r>
-              <a:rPr lang="en-US" altLang="ja-JP" sz="2400" dirty="0"/>
-              <a:t>:  </a:t>
-            </a:r>
-            <a:r>
-              <a:rPr kumimoji="1" lang="en-US" altLang="ja-JP" sz="2400" b="1" dirty="0">
-                <a:solidFill>
-                  <a:srgbClr val="0432FF"/>
-                </a:solidFill>
-              </a:rPr>
-              <a:t>-5 2</a:t>
-            </a:r>
-          </a:p>
-          <a:p>
-            <a:r>
-              <a:rPr lang="en-US" altLang="ja-JP" sz="2400" dirty="0"/>
-              <a:t>“round half to even” </a:t>
-            </a:r>
-            <a:r>
-              <a:rPr lang="en-US" altLang="ja-JP" sz="1800" dirty="0"/>
-              <a:t>(</a:t>
-            </a:r>
-            <a:r>
-              <a:rPr kumimoji="1" lang="en-US" altLang="ja-JP" sz="1800" dirty="0"/>
-              <a:t>e.g. 0.335 and 0.345 </a:t>
-            </a:r>
-            <a:r>
-              <a:rPr kumimoji="1" lang="ja-JP" altLang="en-US" sz="1800"/>
-              <a:t>→</a:t>
-            </a:r>
-            <a:r>
-              <a:rPr kumimoji="1" lang="en-US" altLang="ja-JP" sz="1800" dirty="0"/>
-              <a:t> 0.34) </a:t>
-            </a:r>
-            <a:r>
-              <a:rPr lang="en-US" altLang="ja-JP" sz="2400" dirty="0"/>
-              <a:t>:  </a:t>
-            </a:r>
-            <a:r>
-              <a:rPr kumimoji="1" lang="en-US" altLang="ja-JP" sz="2400" b="1" dirty="0">
-                <a:solidFill>
-                  <a:srgbClr val="0432FF"/>
-                </a:solidFill>
-              </a:rPr>
-              <a:t>-5 e</a:t>
-            </a:r>
-            <a:endParaRPr lang="en-US" altLang="ja-JP" sz="2400" dirty="0"/>
-          </a:p>
-          <a:p>
-            <a:r>
-              <a:rPr kumimoji="1" lang="en-US" altLang="ja-JP" sz="2400" dirty="0"/>
-              <a:t>“round ha</a:t>
-            </a:r>
-            <a:r>
-              <a:rPr lang="en-US" altLang="ja-JP" sz="2400" dirty="0"/>
-              <a:t>lf to odd” </a:t>
-            </a:r>
-            <a:r>
-              <a:rPr lang="en-US" altLang="ja-JP" sz="1800" dirty="0"/>
-              <a:t>(</a:t>
-            </a:r>
-            <a:r>
-              <a:rPr kumimoji="1" lang="en-US" altLang="ja-JP" sz="1800" dirty="0"/>
-              <a:t>e.g. 0.345 and 0.355 </a:t>
-            </a:r>
-            <a:r>
-              <a:rPr kumimoji="1" lang="ja-JP" altLang="en-US" sz="1800"/>
-              <a:t>→</a:t>
-            </a:r>
-            <a:r>
-              <a:rPr kumimoji="1" lang="en-US" altLang="ja-JP" sz="1800" dirty="0"/>
-              <a:t> 0.35) </a:t>
-            </a:r>
-            <a:r>
-              <a:rPr lang="en-US" altLang="ja-JP" sz="2400" dirty="0"/>
-              <a:t>:  </a:t>
-            </a:r>
-            <a:r>
-              <a:rPr kumimoji="1" lang="en-US" altLang="ja-JP" sz="2400" b="1" dirty="0">
-                <a:solidFill>
-                  <a:srgbClr val="0432FF"/>
-                </a:solidFill>
-              </a:rPr>
-              <a:t>-5 o</a:t>
-            </a:r>
-          </a:p>
-          <a:p>
-            <a:endParaRPr lang="en-US" altLang="ja-JP" sz="2400" dirty="0">
-              <a:solidFill>
-                <a:srgbClr val="0432FF"/>
-              </a:solidFill>
-            </a:endParaRPr>
-          </a:p>
-          <a:p>
-            <a:r>
-              <a:rPr kumimoji="1" lang="en-US" altLang="ja-JP" sz="2400" dirty="0"/>
-              <a:t>Allowing the error within ±</a:t>
-            </a:r>
-            <a:r>
-              <a:rPr kumimoji="1" lang="en-US" altLang="ja-JP" sz="2400" i="1" dirty="0"/>
-              <a:t>1%</a:t>
-            </a:r>
-            <a:r>
-              <a:rPr kumimoji="1" lang="en-US" altLang="ja-JP" sz="2400" dirty="0"/>
-              <a:t> : </a:t>
-            </a:r>
-            <a:r>
-              <a:rPr kumimoji="1" lang="en-US" altLang="ja-JP" sz="2400" b="1" dirty="0">
-                <a:solidFill>
-                  <a:srgbClr val="0432FF"/>
-                </a:solidFill>
-              </a:rPr>
-              <a:t>-a 0.01</a:t>
-            </a:r>
-            <a:r>
-              <a:rPr kumimoji="1" lang="en-US" altLang="ja-JP" sz="2400" dirty="0"/>
-              <a:t>  or  </a:t>
-            </a:r>
-            <a:r>
-              <a:rPr kumimoji="1" lang="en-US" altLang="ja-JP" sz="2400" b="1" dirty="0">
-                <a:solidFill>
-                  <a:srgbClr val="0432FF"/>
-                </a:solidFill>
-              </a:rPr>
-              <a:t>-a</a:t>
-            </a:r>
-            <a:r>
-              <a:rPr kumimoji="1" lang="en-US" altLang="ja-JP" sz="2400" dirty="0"/>
-              <a:t> </a:t>
-            </a:r>
-            <a:r>
-              <a:rPr kumimoji="1" lang="en-US" altLang="ja-JP" sz="2400" b="1" dirty="0">
-                <a:solidFill>
-                  <a:srgbClr val="0432FF"/>
-                </a:solidFill>
-              </a:rPr>
-              <a:t>1%</a:t>
-            </a:r>
-          </a:p>
-          <a:p>
-            <a:pPr marL="0" indent="0">
-              <a:buNone/>
-            </a:pPr>
-            <a:endParaRPr kumimoji="1" lang="ja-JP" altLang="en-US" sz="2400" b="1">
-              <a:solidFill>
-                <a:srgbClr val="0432FF"/>
-              </a:solidFill>
-            </a:endParaRPr>
           </a:p>
         </p:txBody>
       </p:sp>
@@ -4892,7 +4605,7 @@
           <p:cNvPr id="4" name="スライド番号プレースホルダー 3">
             <a:extLst>
               <a:ext uri="{FF2B5EF4-FFF2-40B4-BE49-F238E27FC236}">
-                <a16:creationId xmlns:a16="http://schemas.microsoft.com/office/drawing/2014/main" id="{20A62B19-A55F-E98F-CFA8-1CFB4738A2E9}"/>
+                <a16:creationId xmlns:a16="http://schemas.microsoft.com/office/drawing/2014/main" id="{680E6BB9-233D-0FB7-9E1A-8F20F7513E1C}"/>
               </a:ext>
             </a:extLst>
           </p:cNvPr>
@@ -4916,10 +4629,277 @@
           </a:p>
         </p:txBody>
       </p:sp>
+      <p:pic>
+        <p:nvPicPr>
+          <p:cNvPr id="5" name="図 4">
+            <a:extLst>
+              <a:ext uri="{FF2B5EF4-FFF2-40B4-BE49-F238E27FC236}">
+                <a16:creationId xmlns:a16="http://schemas.microsoft.com/office/drawing/2014/main" id="{AFC9A411-2E36-BADA-E51F-E48A1F01BD86}"/>
+              </a:ext>
+            </a:extLst>
+          </p:cNvPr>
+          <p:cNvPicPr>
+            <a:picLocks noChangeAspect="1"/>
+          </p:cNvPicPr>
+          <p:nvPr/>
+        </p:nvPicPr>
+        <p:blipFill>
+          <a:blip r:embed="rId2"/>
+          <a:stretch>
+            <a:fillRect/>
+          </a:stretch>
+        </p:blipFill>
+        <p:spPr>
+          <a:xfrm>
+            <a:off x="628650" y="1298121"/>
+            <a:ext cx="4891171" cy="4261757"/>
+          </a:xfrm>
+          <a:prstGeom prst="rect">
+            <a:avLst/>
+          </a:prstGeom>
+        </p:spPr>
+      </p:pic>
+      <p:sp>
+        <p:nvSpPr>
+          <p:cNvPr id="7" name="テキスト ボックス 6">
+            <a:extLst>
+              <a:ext uri="{FF2B5EF4-FFF2-40B4-BE49-F238E27FC236}">
+                <a16:creationId xmlns:a16="http://schemas.microsoft.com/office/drawing/2014/main" id="{1B0393E5-0B27-B128-64FF-9469787E4F4B}"/>
+              </a:ext>
+            </a:extLst>
+          </p:cNvPr>
+          <p:cNvSpPr txBox="1"/>
+          <p:nvPr/>
+        </p:nvSpPr>
+        <p:spPr>
+          <a:xfrm>
+            <a:off x="628650" y="921212"/>
+            <a:ext cx="4572000" cy="307777"/>
+          </a:xfrm>
+          <a:prstGeom prst="rect">
+            <a:avLst/>
+          </a:prstGeom>
+          <a:noFill/>
+        </p:spPr>
+        <p:txBody>
+          <a:bodyPr wrap="square">
+            <a:spAutoFit/>
+          </a:bodyPr>
+          <a:lstStyle/>
+          <a:p>
+            <a:r>
+              <a:rPr lang="en-US" altLang="ja-JP" sz="1400" b="1" dirty="0">
+                <a:solidFill>
+                  <a:srgbClr val="0432FF"/>
+                </a:solidFill>
+              </a:rPr>
+              <a:t>https://</a:t>
+            </a:r>
+            <a:r>
+              <a:rPr lang="en-US" altLang="ja-JP" sz="1400" b="1" dirty="0" err="1">
+                <a:solidFill>
+                  <a:srgbClr val="0432FF"/>
+                </a:solidFill>
+              </a:rPr>
+              <a:t>www.helpisherede.com</a:t>
+            </a:r>
+            <a:r>
+              <a:rPr lang="en-US" altLang="ja-JP" sz="1400" b="1" dirty="0">
+                <a:solidFill>
+                  <a:srgbClr val="0432FF"/>
+                </a:solidFill>
+              </a:rPr>
+              <a:t>/health-care-providers</a:t>
+            </a:r>
+            <a:endParaRPr lang="ja-JP" altLang="en-US" sz="1400" b="1">
+              <a:solidFill>
+                <a:srgbClr val="0432FF"/>
+              </a:solidFill>
+            </a:endParaRPr>
+          </a:p>
+        </p:txBody>
+      </p:sp>
+      <p:sp>
+        <p:nvSpPr>
+          <p:cNvPr id="8" name="テキスト ボックス 7">
+            <a:extLst>
+              <a:ext uri="{FF2B5EF4-FFF2-40B4-BE49-F238E27FC236}">
+                <a16:creationId xmlns:a16="http://schemas.microsoft.com/office/drawing/2014/main" id="{052C5597-A933-F594-1E10-50688188A1EE}"/>
+              </a:ext>
+            </a:extLst>
+          </p:cNvPr>
+          <p:cNvSpPr txBox="1"/>
+          <p:nvPr/>
+        </p:nvSpPr>
+        <p:spPr>
+          <a:xfrm>
+            <a:off x="5608864" y="996043"/>
+            <a:ext cx="3314700" cy="2862322"/>
+          </a:xfrm>
+          <a:prstGeom prst="rect">
+            <a:avLst/>
+          </a:prstGeom>
+          <a:noFill/>
+        </p:spPr>
+        <p:txBody>
+          <a:bodyPr wrap="square" rtlCol="0">
+            <a:spAutoFit/>
+          </a:bodyPr>
+          <a:lstStyle/>
+          <a:p>
+            <a:r>
+              <a:rPr kumimoji="1" lang="en-US" altLang="ja-JP" dirty="0"/>
+              <a:t>From the 8 numbers, 46.4% 11.7% 12.2% 8.5% 7.6% 6.1% 4.4% 3.2%, also with the assumption that the rounding was done by </a:t>
+            </a:r>
+            <a:r>
+              <a:rPr kumimoji="1" lang="en-US" altLang="ja-JP" b="1" dirty="0"/>
+              <a:t>rounding half up</a:t>
+            </a:r>
+            <a:r>
+              <a:rPr kumimoji="1" lang="en-US" altLang="ja-JP" dirty="0"/>
+              <a:t>,</a:t>
+            </a:r>
+          </a:p>
+          <a:p>
+            <a:r>
+              <a:rPr kumimoji="1" lang="en-US" altLang="ja-JP" dirty="0"/>
+              <a:t>the possible denominator value is either of </a:t>
+            </a:r>
+          </a:p>
+          <a:p>
+            <a:r>
+              <a:rPr kumimoji="1" lang="en-US" altLang="ja-JP" b="1" dirty="0"/>
+              <a:t>343</a:t>
+            </a:r>
+            <a:r>
+              <a:rPr kumimoji="1" lang="en-US" altLang="ja-JP" dirty="0"/>
+              <a:t>, 590, 591, 657, 658, 683, </a:t>
+            </a:r>
+            <a:br>
+              <a:rPr kumimoji="1" lang="en-US" altLang="ja-JP" dirty="0"/>
+            </a:br>
+            <a:r>
+              <a:rPr kumimoji="1" lang="en-US" altLang="ja-JP" dirty="0"/>
+              <a:t>686, 720, 727, 752, 754, 772,</a:t>
+            </a:r>
+          </a:p>
+          <a:p>
+            <a:r>
+              <a:rPr kumimoji="1" lang="en-US" altLang="ja-JP" dirty="0"/>
+              <a:t>and more in the ascending order.</a:t>
+            </a:r>
+          </a:p>
+        </p:txBody>
+      </p:sp>
+      <p:sp>
+        <p:nvSpPr>
+          <p:cNvPr id="10" name="テキスト ボックス 9">
+            <a:extLst>
+              <a:ext uri="{FF2B5EF4-FFF2-40B4-BE49-F238E27FC236}">
+                <a16:creationId xmlns:a16="http://schemas.microsoft.com/office/drawing/2014/main" id="{A80DF4E2-0CD8-479A-78BB-C2C7CCD8BAE9}"/>
+              </a:ext>
+            </a:extLst>
+          </p:cNvPr>
+          <p:cNvSpPr txBox="1"/>
+          <p:nvPr/>
+        </p:nvSpPr>
+        <p:spPr>
+          <a:xfrm>
+            <a:off x="4351564" y="4137861"/>
+            <a:ext cx="4572000" cy="1200329"/>
+          </a:xfrm>
+          <a:prstGeom prst="rect">
+            <a:avLst/>
+          </a:prstGeom>
+          <a:noFill/>
+        </p:spPr>
+        <p:txBody>
+          <a:bodyPr wrap="square">
+            <a:spAutoFit/>
+          </a:bodyPr>
+          <a:lstStyle/>
+          <a:p>
+            <a:r>
+              <a:rPr lang="en-US" altLang="ja-JP" dirty="0"/>
+              <a:t>This graph is cited from : </a:t>
+            </a:r>
+          </a:p>
+          <a:p>
+            <a:r>
+              <a:rPr lang="ja-JP" altLang="en-US">
+                <a:solidFill>
+                  <a:srgbClr val="0432FF"/>
+                </a:solidFill>
+              </a:rPr>
+              <a:t>https://www.dhss.delaware.gov/dhss/dph/files/dedrugoverdosemortsurvrpt2017.pdf</a:t>
+            </a:r>
+            <a:endParaRPr lang="en-US" altLang="ja-JP" dirty="0">
+              <a:solidFill>
+                <a:srgbClr val="0432FF"/>
+              </a:solidFill>
+            </a:endParaRPr>
+          </a:p>
+          <a:p>
+            <a:r>
+              <a:rPr lang="en-US" altLang="ja-JP" dirty="0"/>
+              <a:t>and this article says the original number is </a:t>
+            </a:r>
+            <a:r>
+              <a:rPr lang="en-US" altLang="ja-JP" b="1" dirty="0">
+                <a:solidFill>
+                  <a:srgbClr val="0432FF"/>
+                </a:solidFill>
+              </a:rPr>
+              <a:t>343</a:t>
+            </a:r>
+            <a:r>
+              <a:rPr lang="en-US" altLang="ja-JP" dirty="0"/>
+              <a:t>.</a:t>
+            </a:r>
+            <a:endParaRPr lang="ja-JP" altLang="en-US"/>
+          </a:p>
+        </p:txBody>
+      </p:sp>
+      <p:sp>
+        <p:nvSpPr>
+          <p:cNvPr id="11" name="テキスト ボックス 10">
+            <a:extLst>
+              <a:ext uri="{FF2B5EF4-FFF2-40B4-BE49-F238E27FC236}">
+                <a16:creationId xmlns:a16="http://schemas.microsoft.com/office/drawing/2014/main" id="{51283026-07A5-E0CF-8483-1836097E146F}"/>
+              </a:ext>
+            </a:extLst>
+          </p:cNvPr>
+          <p:cNvSpPr txBox="1"/>
+          <p:nvPr/>
+        </p:nvSpPr>
+        <p:spPr>
+          <a:xfrm>
+            <a:off x="767443" y="5633357"/>
+            <a:ext cx="7543800" cy="923330"/>
+          </a:xfrm>
+          <a:prstGeom prst="rect">
+            <a:avLst/>
+          </a:prstGeom>
+          <a:noFill/>
+        </p:spPr>
+        <p:txBody>
+          <a:bodyPr wrap="square" rtlCol="0">
+            <a:spAutoFit/>
+          </a:bodyPr>
+          <a:lstStyle/>
+          <a:p>
+            <a:r>
+              <a:rPr kumimoji="1" lang="en-US" altLang="ja-JP" dirty="0"/>
+              <a:t>A derivative question :  when the candidates of possible integer denominators are calculated, the minimum value among them is quite often the real value. Why? </a:t>
+            </a:r>
+            <a:endParaRPr kumimoji="1" lang="ja-JP" altLang="en-US"/>
+          </a:p>
+        </p:txBody>
+      </p:sp>
     </p:spTree>
     <p:extLst>
       <p:ext uri="{BB962C8B-B14F-4D97-AF65-F5344CB8AC3E}">
-        <p14:creationId xmlns:p14="http://schemas.microsoft.com/office/powerpoint/2010/main" val="3859435334"/>
+        <p14:creationId xmlns:p14="http://schemas.microsoft.com/office/powerpoint/2010/main" val="2476187221"/>
       </p:ext>
     </p:extLst>
   </p:cSld>
@@ -4951,7 +4931,7 @@
           <p:cNvPr id="2" name="タイトル 1">
             <a:extLst>
               <a:ext uri="{FF2B5EF4-FFF2-40B4-BE49-F238E27FC236}">
-                <a16:creationId xmlns:a16="http://schemas.microsoft.com/office/drawing/2014/main" id="{D6C10A47-1CBC-AF40-F2E8-ABF5F56F77D2}"/>
+                <a16:creationId xmlns:a16="http://schemas.microsoft.com/office/drawing/2014/main" id="{13DB1389-1338-4CB4-559B-886C43B95EA2}"/>
               </a:ext>
             </a:extLst>
           </p:cNvPr>
@@ -4964,8 +4944,8 @@
         </p:nvSpPr>
         <p:spPr>
           <a:xfrm>
-            <a:off x="628650" y="365126"/>
-            <a:ext cx="7886700" cy="315911"/>
+            <a:off x="628650" y="365127"/>
+            <a:ext cx="7886700" cy="684446"/>
           </a:xfrm>
         </p:spPr>
         <p:txBody>
@@ -4976,7 +4956,7 @@
           <a:p>
             <a:r>
               <a:rPr kumimoji="1" lang="en-US" altLang="ja-JP" dirty="0"/>
-              <a:t>Options in the denominator filtering</a:t>
+              <a:t>Various options in rounding </a:t>
             </a:r>
             <a:endParaRPr kumimoji="1" lang="ja-JP" altLang="en-US"/>
           </a:p>
@@ -4987,7 +4967,7 @@
           <p:cNvPr id="3" name="コンテンツ プレースホルダー 2">
             <a:extLst>
               <a:ext uri="{FF2B5EF4-FFF2-40B4-BE49-F238E27FC236}">
-                <a16:creationId xmlns:a16="http://schemas.microsoft.com/office/drawing/2014/main" id="{C81BD508-E147-CF3C-1307-85ED77A84112}"/>
+                <a16:creationId xmlns:a16="http://schemas.microsoft.com/office/drawing/2014/main" id="{21155940-76B4-8DC5-C6B6-DBF942B6C899}"/>
               </a:ext>
             </a:extLst>
           </p:cNvPr>
@@ -5000,8 +4980,8 @@
         </p:nvSpPr>
         <p:spPr>
           <a:xfrm>
-            <a:off x="628650" y="1026092"/>
-            <a:ext cx="7886700" cy="5270514"/>
+            <a:off x="628650" y="1280160"/>
+            <a:ext cx="7886700" cy="4896803"/>
           </a:xfrm>
         </p:spPr>
         <p:txBody>
@@ -5010,49 +4990,211 @@
           </a:bodyPr>
           <a:lstStyle/>
           <a:p>
-            <a:r>
-              <a:rPr kumimoji="1" lang="en-US" altLang="ja-JP" sz="2000" dirty="0">
+            <a:pPr marL="0" indent="0">
+              <a:buNone/>
+            </a:pPr>
+            <a:r>
+              <a:rPr kumimoji="1" lang="en-US" altLang="ja-JP" sz="3200" dirty="0"/>
+              <a:t>Assuming the rounding</a:t>
+            </a:r>
+          </a:p>
+          <a:p>
+            <a:r>
+              <a:rPr kumimoji="1" lang="en-US" altLang="ja-JP" sz="2400" dirty="0"/>
+              <a:t>“round down” </a:t>
+            </a:r>
+            <a:r>
+              <a:rPr kumimoji="1" lang="en-US" altLang="ja-JP" sz="2000" dirty="0"/>
+              <a:t>(floor ; e.g. 0.345 </a:t>
+            </a:r>
+            <a:r>
+              <a:rPr kumimoji="1" lang="ja-JP" altLang="en-US" sz="2000"/>
+              <a:t>→</a:t>
+            </a:r>
+            <a:r>
+              <a:rPr kumimoji="1" lang="en-US" altLang="ja-JP" sz="2000" dirty="0"/>
+              <a:t> 0.34)</a:t>
+            </a:r>
+            <a:r>
+              <a:rPr kumimoji="1" lang="en-US" altLang="ja-JP" sz="2400" dirty="0"/>
+              <a:t> : </a:t>
+            </a:r>
+            <a:r>
+              <a:rPr kumimoji="1" lang="en-US" altLang="ja-JP" sz="2400" b="1" dirty="0">
                 <a:solidFill>
                   <a:srgbClr val="0432FF"/>
                 </a:solidFill>
               </a:rPr>
-              <a:t>-g 100</a:t>
+              <a:t>–f</a:t>
+            </a:r>
+            <a:r>
+              <a:rPr kumimoji="1" lang="en-US" altLang="ja-JP" sz="2400" dirty="0"/>
+              <a:t> </a:t>
+            </a:r>
+          </a:p>
+          <a:p>
+            <a:r>
+              <a:rPr lang="en-US" altLang="ja-JP" sz="2400" dirty="0"/>
+              <a:t>“round up” </a:t>
+            </a:r>
+            <a:r>
+              <a:rPr lang="en-US" altLang="ja-JP" sz="2000" dirty="0"/>
+              <a:t>(ceil</a:t>
             </a:r>
             <a:r>
               <a:rPr kumimoji="1" lang="en-US" altLang="ja-JP" sz="2000" dirty="0"/>
-              <a:t> : getting 100 candidates in denominators from the smallest (1). </a:t>
-            </a:r>
-          </a:p>
-          <a:p>
-            <a:r>
-              <a:rPr kumimoji="1" lang="en-US" altLang="ja-JP" sz="2000" dirty="0">
+              <a:t> ; e.g. 0.345 </a:t>
+            </a:r>
+            <a:r>
+              <a:rPr kumimoji="1" lang="ja-JP" altLang="en-US" sz="2000"/>
+              <a:t>→</a:t>
+            </a:r>
+            <a:r>
+              <a:rPr kumimoji="1" lang="en-US" altLang="ja-JP" sz="2000" dirty="0"/>
+              <a:t> 0.35</a:t>
+            </a:r>
+            <a:r>
+              <a:rPr lang="en-US" altLang="ja-JP" sz="2000" dirty="0"/>
+              <a:t>)</a:t>
+            </a:r>
+            <a:r>
+              <a:rPr lang="en-US" altLang="ja-JP" sz="2400" dirty="0"/>
+              <a:t> : </a:t>
+            </a:r>
+            <a:r>
+              <a:rPr lang="en-US" altLang="ja-JP" sz="2400" b="1" dirty="0">
                 <a:solidFill>
                   <a:srgbClr val="0432FF"/>
                 </a:solidFill>
               </a:rPr>
-              <a:t>-g 123,100</a:t>
-            </a:r>
-            <a:r>
-              <a:rPr kumimoji="1" lang="en-US" altLang="ja-JP" sz="2000" dirty="0"/>
-              <a:t> : getting 100 candidates in denominators from the 123.</a:t>
-            </a:r>
-          </a:p>
-          <a:p>
-            <a:r>
-              <a:rPr kumimoji="1" lang="en-US" altLang="ja-JP" sz="2000" dirty="0">
+              <a:t>–c</a:t>
+            </a:r>
+            <a:r>
+              <a:rPr lang="en-US" altLang="ja-JP" sz="2400" dirty="0"/>
+              <a:t> </a:t>
+            </a:r>
+          </a:p>
+          <a:p>
+            <a:r>
+              <a:rPr lang="en-US" altLang="ja-JP" sz="2400" dirty="0"/>
+              <a:t>“round half up” is done twice </a:t>
+            </a:r>
+            <a:r>
+              <a:rPr lang="en-US" altLang="ja-JP" sz="2000" dirty="0"/>
+              <a:t>( </a:t>
+            </a:r>
+            <a:r>
+              <a:rPr lang="en-US" altLang="ja-JP" sz="2000" i="1" dirty="0"/>
+              <a:t>e.g.</a:t>
+            </a:r>
+            <a:r>
+              <a:rPr lang="en-US" altLang="ja-JP" sz="2000" dirty="0"/>
+              <a:t> 0.345</a:t>
+            </a:r>
+            <a:r>
+              <a:rPr lang="ja-JP" altLang="en-US" sz="2000"/>
+              <a:t>→</a:t>
+            </a:r>
+            <a:r>
+              <a:rPr lang="en-US" altLang="ja-JP" sz="2000" dirty="0"/>
+              <a:t>0.35</a:t>
+            </a:r>
+            <a:r>
+              <a:rPr lang="ja-JP" altLang="en-US" sz="2000"/>
+              <a:t>→</a:t>
+            </a:r>
+            <a:r>
+              <a:rPr lang="en-US" altLang="ja-JP" sz="2000" dirty="0"/>
+              <a:t>0.4 ) </a:t>
+            </a:r>
+            <a:r>
+              <a:rPr lang="en-US" altLang="ja-JP" sz="2400" dirty="0"/>
+              <a:t>:  </a:t>
+            </a:r>
+            <a:r>
+              <a:rPr kumimoji="1" lang="en-US" altLang="ja-JP" sz="2400" b="1" dirty="0">
                 <a:solidFill>
                   <a:srgbClr val="0432FF"/>
                 </a:solidFill>
               </a:rPr>
-              <a:t>-g 123,-10</a:t>
-            </a:r>
-            <a:r>
-              <a:rPr kumimoji="1" lang="en-US" altLang="ja-JP" sz="2000" dirty="0"/>
-              <a:t> : getting 10 candidates from the 123 in descending order.</a:t>
-            </a:r>
-          </a:p>
-          <a:p>
-            <a:endParaRPr kumimoji="1" lang="en-US" altLang="ja-JP" sz="2000" dirty="0">
+              <a:t>-5 2</a:t>
+            </a:r>
+          </a:p>
+          <a:p>
+            <a:r>
+              <a:rPr lang="en-US" altLang="ja-JP" sz="2400" dirty="0"/>
+              <a:t>“round half to even” </a:t>
+            </a:r>
+            <a:r>
+              <a:rPr lang="en-US" altLang="ja-JP" sz="1800" dirty="0"/>
+              <a:t>(</a:t>
+            </a:r>
+            <a:r>
+              <a:rPr kumimoji="1" lang="en-US" altLang="ja-JP" sz="1800" dirty="0"/>
+              <a:t>e.g. 0.335 and 0.345 </a:t>
+            </a:r>
+            <a:r>
+              <a:rPr kumimoji="1" lang="ja-JP" altLang="en-US" sz="1800"/>
+              <a:t>→</a:t>
+            </a:r>
+            <a:r>
+              <a:rPr kumimoji="1" lang="en-US" altLang="ja-JP" sz="1800" dirty="0"/>
+              <a:t> 0.34) </a:t>
+            </a:r>
+            <a:r>
+              <a:rPr lang="en-US" altLang="ja-JP" sz="2400" dirty="0"/>
+              <a:t>:  </a:t>
+            </a:r>
+            <a:r>
+              <a:rPr kumimoji="1" lang="en-US" altLang="ja-JP" sz="2400" b="1" dirty="0">
+                <a:solidFill>
+                  <a:srgbClr val="0432FF"/>
+                </a:solidFill>
+              </a:rPr>
+              <a:t>-5 e</a:t>
+            </a:r>
+            <a:endParaRPr lang="en-US" altLang="ja-JP" sz="2400" dirty="0"/>
+          </a:p>
+          <a:p>
+            <a:r>
+              <a:rPr kumimoji="1" lang="en-US" altLang="ja-JP" sz="2400" dirty="0"/>
+              <a:t>“round ha</a:t>
+            </a:r>
+            <a:r>
+              <a:rPr lang="en-US" altLang="ja-JP" sz="2400" dirty="0"/>
+              <a:t>lf to odd” </a:t>
+            </a:r>
+            <a:r>
+              <a:rPr lang="en-US" altLang="ja-JP" sz="1800" dirty="0"/>
+              <a:t>(</a:t>
+            </a:r>
+            <a:r>
+              <a:rPr kumimoji="1" lang="en-US" altLang="ja-JP" sz="1800" dirty="0"/>
+              <a:t>e.g. 0.345 and 0.355 </a:t>
+            </a:r>
+            <a:r>
+              <a:rPr kumimoji="1" lang="ja-JP" altLang="en-US" sz="1800"/>
+              <a:t>→</a:t>
+            </a:r>
+            <a:r>
+              <a:rPr kumimoji="1" lang="en-US" altLang="ja-JP" sz="1800" dirty="0"/>
+              <a:t> 0.35) </a:t>
+            </a:r>
+            <a:r>
+              <a:rPr lang="en-US" altLang="ja-JP" sz="2400" dirty="0"/>
+              <a:t>:  </a:t>
+            </a:r>
+            <a:r>
+              <a:rPr kumimoji="1" lang="en-US" altLang="ja-JP" sz="2400" b="1" dirty="0">
+                <a:solidFill>
+                  <a:srgbClr val="0432FF"/>
+                </a:solidFill>
+              </a:rPr>
+              <a:t>-5 o</a:t>
+            </a:r>
+          </a:p>
+          <a:p>
+            <a:endParaRPr lang="en-US" altLang="ja-JP" sz="2400" dirty="0">
               <a:solidFill>
                 <a:srgbClr val="0432FF"/>
               </a:solidFill>
@@ -5060,180 +5202,59 @@
           </a:p>
           <a:p>
             <a:r>
-              <a:rPr kumimoji="1" lang="en-US" altLang="ja-JP" sz="2000" dirty="0">
+              <a:rPr kumimoji="1" lang="en-US" altLang="ja-JP" sz="2400" dirty="0"/>
+              <a:t>Allowing the error within ±</a:t>
+            </a:r>
+            <a:r>
+              <a:rPr kumimoji="1" lang="en-US" altLang="ja-JP" sz="2400" i="1" dirty="0"/>
+              <a:t>1%</a:t>
+            </a:r>
+            <a:r>
+              <a:rPr kumimoji="1" lang="en-US" altLang="ja-JP" sz="2400" dirty="0"/>
+              <a:t> : </a:t>
+            </a:r>
+            <a:r>
+              <a:rPr kumimoji="1" lang="en-US" altLang="ja-JP" sz="2400" b="1" dirty="0">
                 <a:solidFill>
                   <a:srgbClr val="0432FF"/>
                 </a:solidFill>
               </a:rPr>
-              <a:t>-y .. </a:t>
-            </a:r>
-            <a:r>
-              <a:rPr kumimoji="1" lang="en-US" altLang="ja-JP" sz="2000" dirty="0"/>
-              <a:t>: showing </a:t>
-            </a:r>
-            <a:r>
-              <a:rPr kumimoji="1" lang="en-US" altLang="ja-JP" sz="2000" b="1" dirty="0"/>
-              <a:t>every denominator</a:t>
-            </a:r>
-            <a:r>
-              <a:rPr kumimoji="1" lang="en-US" altLang="ja-JP" sz="2000" dirty="0"/>
-              <a:t> as long as specified by </a:t>
-            </a:r>
-            <a:r>
-              <a:rPr kumimoji="1" lang="en-US" altLang="ja-JP" sz="2000" b="1" dirty="0">
+              <a:t>-a 0.01</a:t>
+            </a:r>
+            <a:r>
+              <a:rPr kumimoji="1" lang="en-US" altLang="ja-JP" sz="2400" dirty="0"/>
+              <a:t>  or  </a:t>
+            </a:r>
+            <a:r>
+              <a:rPr kumimoji="1" lang="en-US" altLang="ja-JP" sz="2400" b="1" dirty="0">
                 <a:solidFill>
                   <a:srgbClr val="0432FF"/>
                 </a:solidFill>
               </a:rPr>
-              <a:t>–g </a:t>
-            </a:r>
-            <a:r>
-              <a:rPr kumimoji="1" lang="en-US" altLang="ja-JP" sz="2000" dirty="0"/>
-              <a:t>option.</a:t>
-            </a:r>
-          </a:p>
-          <a:p>
-            <a:r>
-              <a:rPr kumimoji="1" lang="en-US" altLang="ja-JP" sz="2000" dirty="0">
+              <a:t>-a</a:t>
+            </a:r>
+            <a:r>
+              <a:rPr kumimoji="1" lang="en-US" altLang="ja-JP" sz="2400" dirty="0"/>
+              <a:t> </a:t>
+            </a:r>
+            <a:r>
+              <a:rPr kumimoji="1" lang="en-US" altLang="ja-JP" sz="2400" b="1" dirty="0">
                 <a:solidFill>
                   <a:srgbClr val="0432FF"/>
                 </a:solidFill>
               </a:rPr>
-              <a:t>-y ,</a:t>
-            </a:r>
-            <a:r>
-              <a:rPr kumimoji="1" lang="en-US" altLang="ja-JP" sz="2000" dirty="0"/>
-              <a:t>  : only showing the denominators when </a:t>
-            </a:r>
-            <a:r>
-              <a:rPr kumimoji="1" lang="en-US" altLang="ja-JP" sz="2000" b="1" dirty="0"/>
-              <a:t>every given proportion</a:t>
-            </a:r>
-            <a:br>
-              <a:rPr kumimoji="1" lang="en-US" altLang="ja-JP" sz="2000" dirty="0"/>
-            </a:br>
-            <a:r>
-              <a:rPr kumimoji="1" lang="en-US" altLang="ja-JP" sz="2000" dirty="0"/>
-              <a:t>           </a:t>
-            </a:r>
-            <a:r>
-              <a:rPr kumimoji="1" lang="en-US" altLang="ja-JP" sz="2000" u="sng" dirty="0"/>
-              <a:t>has at least one corresponding integer numerator</a:t>
-            </a:r>
-            <a:r>
-              <a:rPr kumimoji="1" lang="en-US" altLang="ja-JP" sz="2000" dirty="0"/>
-              <a:t>.</a:t>
-            </a:r>
-          </a:p>
-          <a:p>
-            <a:r>
-              <a:rPr kumimoji="1" lang="en-US" altLang="ja-JP" sz="2000" dirty="0">
-                <a:solidFill>
-                  <a:srgbClr val="0432FF"/>
-                </a:solidFill>
-              </a:rPr>
-              <a:t>-y 1..</a:t>
-            </a:r>
-            <a:r>
-              <a:rPr kumimoji="1" lang="en-US" altLang="ja-JP" sz="2000" dirty="0"/>
-              <a:t>  : showing the denominators when at least one of given proportion</a:t>
-            </a:r>
-            <a:br>
-              <a:rPr kumimoji="1" lang="en-US" altLang="ja-JP" sz="2000" dirty="0"/>
-            </a:br>
-            <a:r>
-              <a:rPr kumimoji="1" lang="en-US" altLang="ja-JP" sz="2000" dirty="0"/>
-              <a:t>                 has the corresponding integer numerator. (</a:t>
-            </a:r>
-            <a:r>
-              <a:rPr kumimoji="1" lang="en-US" altLang="ja-JP" sz="2000" b="1" dirty="0"/>
-              <a:t>Default</a:t>
-            </a:r>
-            <a:r>
-              <a:rPr kumimoji="1" lang="en-US" altLang="ja-JP" sz="2000" dirty="0"/>
-              <a:t>)</a:t>
-            </a:r>
-          </a:p>
-          <a:p>
-            <a:r>
-              <a:rPr kumimoji="1" lang="en-US" altLang="ja-JP" sz="2000" dirty="0">
-                <a:solidFill>
-                  <a:srgbClr val="0432FF"/>
-                </a:solidFill>
-              </a:rPr>
-              <a:t>-y -2..</a:t>
-            </a:r>
-            <a:r>
-              <a:rPr kumimoji="1" lang="en-US" altLang="ja-JP" sz="2000" dirty="0"/>
-              <a:t>  : showing the denominators when every given proportion</a:t>
-            </a:r>
-            <a:br>
-              <a:rPr kumimoji="1" lang="en-US" altLang="ja-JP" sz="2000" dirty="0"/>
-            </a:br>
-            <a:r>
-              <a:rPr kumimoji="1" lang="en-US" altLang="ja-JP" sz="2000" dirty="0"/>
-              <a:t>                 has the corresponding integer numerator </a:t>
-            </a:r>
-            <a:br>
-              <a:rPr kumimoji="1" lang="en-US" altLang="ja-JP" sz="2000" dirty="0"/>
-            </a:br>
-            <a:r>
-              <a:rPr kumimoji="1" lang="en-US" altLang="ja-JP" sz="2000" dirty="0"/>
-              <a:t>                   allowing the </a:t>
-            </a:r>
-            <a:r>
-              <a:rPr kumimoji="1" lang="en-US" altLang="ja-JP" sz="2000" b="1" dirty="0"/>
-              <a:t>exceptions</a:t>
-            </a:r>
-            <a:r>
-              <a:rPr kumimoji="1" lang="en-US" altLang="ja-JP" sz="2000" dirty="0"/>
-              <a:t> within 2 of the proportions.</a:t>
+              <a:t>1%</a:t>
             </a:r>
           </a:p>
           <a:p>
             <a:pPr marL="0" indent="0">
               <a:buNone/>
             </a:pPr>
-            <a:r>
-              <a:rPr lang="en-US" altLang="ja-JP" sz="2000" dirty="0">
-                <a:solidFill>
-                  <a:srgbClr val="0432FF"/>
-                </a:solidFill>
-              </a:rPr>
-              <a:t>N..M</a:t>
-            </a:r>
-            <a:r>
-              <a:rPr lang="en-US" altLang="ja-JP" sz="2000" dirty="0"/>
-              <a:t> means the numerical range. </a:t>
-            </a:r>
-            <a:r>
-              <a:rPr lang="en-US" altLang="ja-JP" sz="2000" dirty="0">
-                <a:solidFill>
-                  <a:srgbClr val="0432FF"/>
-                </a:solidFill>
-              </a:rPr>
-              <a:t>N..</a:t>
-            </a:r>
-            <a:r>
-              <a:rPr lang="en-US" altLang="ja-JP" sz="2000" dirty="0"/>
-              <a:t> means n to the maximum. </a:t>
-            </a:r>
-            <a:r>
-              <a:rPr lang="en-US" altLang="ja-JP" sz="2000" dirty="0">
-                <a:solidFill>
-                  <a:srgbClr val="0432FF"/>
-                </a:solidFill>
-              </a:rPr>
-              <a:t>..M</a:t>
-            </a:r>
-            <a:r>
-              <a:rPr lang="en-US" altLang="ja-JP" sz="2000" dirty="0"/>
-              <a:t> means zero to M. When N or M is negative, it means (the maximum)-abs(N or M). Those types of range or a single number can be combined by comma(,).</a:t>
-            </a:r>
-            <a:endParaRPr kumimoji="1" lang="en-US" altLang="ja-JP" sz="2000" dirty="0"/>
-          </a:p>
-          <a:p>
-            <a:endParaRPr kumimoji="1" lang="ja-JP" altLang="en-US" sz="2000"/>
+            <a:endParaRPr kumimoji="1" lang="ja-JP" altLang="en-US" sz="2400" b="1">
+              <a:solidFill>
+                <a:srgbClr val="0432FF"/>
+              </a:solidFill>
+            </a:endParaRPr>
           </a:p>
         </p:txBody>
       </p:sp>
@@ -5242,7 +5263,7 @@
           <p:cNvPr id="4" name="スライド番号プレースホルダー 3">
             <a:extLst>
               <a:ext uri="{FF2B5EF4-FFF2-40B4-BE49-F238E27FC236}">
-                <a16:creationId xmlns:a16="http://schemas.microsoft.com/office/drawing/2014/main" id="{649F05BB-B3FB-4529-3B29-6C258BEAC413}"/>
+                <a16:creationId xmlns:a16="http://schemas.microsoft.com/office/drawing/2014/main" id="{20A62B19-A55F-E98F-CFA8-1CFB4738A2E9}"/>
               </a:ext>
             </a:extLst>
           </p:cNvPr>
@@ -5269,7 +5290,7 @@
     </p:spTree>
     <p:extLst>
       <p:ext uri="{BB962C8B-B14F-4D97-AF65-F5344CB8AC3E}">
-        <p14:creationId xmlns:p14="http://schemas.microsoft.com/office/powerpoint/2010/main" val="2125685854"/>
+        <p14:creationId xmlns:p14="http://schemas.microsoft.com/office/powerpoint/2010/main" val="3859435334"/>
       </p:ext>
     </p:extLst>
   </p:cSld>
@@ -5326,7 +5347,7 @@
           <a:p>
             <a:r>
               <a:rPr kumimoji="1" lang="en-US" altLang="ja-JP" dirty="0"/>
-              <a:t>Options in output</a:t>
+              <a:t>Options in the denominator filtering</a:t>
             </a:r>
             <a:endParaRPr kumimoji="1" lang="ja-JP" altLang="en-US"/>
           </a:p>
@@ -5350,13 +5371,13 @@
         </p:nvSpPr>
         <p:spPr>
           <a:xfrm>
-            <a:off x="628650" y="906449"/>
+            <a:off x="628650" y="1026092"/>
             <a:ext cx="7886700" cy="5270514"/>
           </a:xfrm>
         </p:spPr>
         <p:txBody>
           <a:bodyPr>
-            <a:normAutofit fontScale="92500" lnSpcReduction="10000"/>
+            <a:normAutofit/>
           </a:bodyPr>
           <a:lstStyle/>
           <a:p>
@@ -5366,196 +5387,42 @@
                   <a:srgbClr val="0432FF"/>
                 </a:solidFill>
               </a:rPr>
-              <a:t>-D0 </a:t>
+              <a:t>-g 100</a:t>
             </a:r>
             <a:r>
               <a:rPr kumimoji="1" lang="en-US" altLang="ja-JP" sz="2000" dirty="0"/>
-              <a:t>: showing the fraction form such as </a:t>
-            </a:r>
-            <a:r>
-              <a:rPr kumimoji="1" lang="en-US" altLang="ja-JP" sz="2000" b="1" dirty="0">
-                <a:solidFill>
-                  <a:schemeClr val="accent5">
-                    <a:lumMod val="75000"/>
-                  </a:schemeClr>
-                </a:solidFill>
-              </a:rPr>
-              <a:t>10/33</a:t>
+              <a:t> : getting 100 candidates in denominators from the smallest (1). </a:t>
+            </a:r>
+          </a:p>
+          <a:p>
+            <a:r>
+              <a:rPr kumimoji="1" lang="en-US" altLang="ja-JP" sz="2000" dirty="0">
+                <a:solidFill>
+                  <a:srgbClr val="0432FF"/>
+                </a:solidFill>
+              </a:rPr>
+              <a:t>-g 123,100</a:t>
             </a:r>
             <a:r>
               <a:rPr kumimoji="1" lang="en-US" altLang="ja-JP" sz="2000" dirty="0"/>
-              <a:t>. (</a:t>
-            </a:r>
-            <a:r>
-              <a:rPr kumimoji="1" lang="en-US" altLang="ja-JP" sz="2000" b="1" dirty="0"/>
-              <a:t>Default</a:t>
+              <a:t> : getting 100 candidates in denominators from the 123.</a:t>
+            </a:r>
+          </a:p>
+          <a:p>
+            <a:r>
+              <a:rPr kumimoji="1" lang="en-US" altLang="ja-JP" sz="2000" dirty="0">
+                <a:solidFill>
+                  <a:srgbClr val="0432FF"/>
+                </a:solidFill>
+              </a:rPr>
+              <a:t>-g 123,-10</a:t>
             </a:r>
             <a:r>
               <a:rPr kumimoji="1" lang="en-US" altLang="ja-JP" sz="2000" dirty="0"/>
-              <a:t> </a:t>
-            </a:r>
-            <a:r>
-              <a:rPr lang="en-US" altLang="ja-JP" sz="1800" dirty="0"/>
-              <a:t>※</a:t>
-            </a:r>
-            <a:r>
-              <a:rPr kumimoji="1" lang="en-US" altLang="ja-JP" sz="2000" dirty="0"/>
-              <a:t>)</a:t>
-            </a:r>
-          </a:p>
-          <a:p>
-            <a:r>
-              <a:rPr kumimoji="1" lang="en-US" altLang="ja-JP" sz="2000" dirty="0">
-                <a:solidFill>
-                  <a:srgbClr val="0432FF"/>
-                </a:solidFill>
-              </a:rPr>
-              <a:t>-D3</a:t>
-            </a:r>
-            <a:r>
-              <a:rPr kumimoji="1" lang="en-US" altLang="ja-JP" sz="2000" dirty="0"/>
-              <a:t> : showing also with 3 decimal places such as </a:t>
-            </a:r>
-            <a:r>
-              <a:rPr kumimoji="1" lang="en-US" altLang="ja-JP" sz="2000" b="1" dirty="0">
-                <a:solidFill>
-                  <a:schemeClr val="accent5">
-                    <a:lumMod val="75000"/>
-                  </a:schemeClr>
-                </a:solidFill>
-              </a:rPr>
-              <a:t>10/33=.303</a:t>
-            </a:r>
-          </a:p>
-          <a:p>
-            <a:r>
-              <a:rPr kumimoji="1" lang="en-US" altLang="ja-JP" sz="2000" dirty="0">
-                <a:solidFill>
-                  <a:srgbClr val="0432FF"/>
-                </a:solidFill>
-              </a:rPr>
-              <a:t>-D4%</a:t>
-            </a:r>
-            <a:r>
-              <a:rPr kumimoji="1" lang="en-US" altLang="ja-JP" sz="2000" dirty="0"/>
-              <a:t> : in 4 decimal places in percentage such as </a:t>
-            </a:r>
-            <a:r>
-              <a:rPr kumimoji="1" lang="en-US" altLang="ja-JP" sz="2000" b="1" dirty="0">
-                <a:solidFill>
-                  <a:schemeClr val="accent5">
-                    <a:lumMod val="75000"/>
-                  </a:schemeClr>
-                </a:solidFill>
-              </a:rPr>
-              <a:t>10/33=30.3030%</a:t>
-            </a:r>
-          </a:p>
-          <a:p>
-            <a:r>
-              <a:rPr kumimoji="1" lang="en-US" altLang="ja-JP" sz="2000" dirty="0">
-                <a:solidFill>
-                  <a:srgbClr val="0432FF"/>
-                </a:solidFill>
-              </a:rPr>
-              <a:t>-D-5</a:t>
-            </a:r>
-            <a:r>
-              <a:rPr kumimoji="1" lang="en-US" altLang="ja-JP" sz="2000" dirty="0"/>
-              <a:t> : showing the difference to realize the given proportion with 5 decimal places </a:t>
-            </a:r>
-            <a:r>
-              <a:rPr kumimoji="1" lang="en-US" altLang="ja-JP" sz="2000" b="1" dirty="0">
-                <a:solidFill>
-                  <a:schemeClr val="accent5">
-                    <a:lumMod val="75000"/>
-                  </a:schemeClr>
-                </a:solidFill>
-              </a:rPr>
-              <a:t>10/33-.00003</a:t>
-            </a:r>
-            <a:r>
-              <a:rPr kumimoji="1" lang="en-US" altLang="ja-JP" sz="2000" dirty="0">
-                <a:solidFill>
-                  <a:schemeClr val="accent5">
-                    <a:lumMod val="75000"/>
-                  </a:schemeClr>
-                </a:solidFill>
-              </a:rPr>
-              <a:t> </a:t>
-            </a:r>
-            <a:r>
-              <a:rPr kumimoji="1" lang="en-US" altLang="ja-JP" sz="2000" dirty="0"/>
-              <a:t>for a given proportion</a:t>
-            </a:r>
-            <a:r>
-              <a:rPr kumimoji="1" lang="en-US" altLang="ja-JP" sz="2000" dirty="0">
-                <a:solidFill>
-                  <a:srgbClr val="0432FF"/>
-                </a:solidFill>
-              </a:rPr>
-              <a:t> 0.303</a:t>
-            </a:r>
-          </a:p>
-          <a:p>
-            <a:r>
-              <a:rPr kumimoji="1" lang="en-US" altLang="ja-JP" sz="2000" dirty="0">
-                <a:solidFill>
-                  <a:srgbClr val="0432FF"/>
-                </a:solidFill>
-              </a:rPr>
-              <a:t>-D-6%</a:t>
-            </a:r>
-            <a:r>
-              <a:rPr kumimoji="1" lang="en-US" altLang="ja-JP" sz="2000" dirty="0"/>
-              <a:t> : showing the difference to realize the given proportion </a:t>
-            </a:r>
-            <a:br>
-              <a:rPr kumimoji="1" lang="en-US" altLang="ja-JP" sz="2000" dirty="0"/>
-            </a:br>
-            <a:r>
-              <a:rPr kumimoji="1" lang="en-US" altLang="ja-JP" sz="2000" dirty="0"/>
-              <a:t>  with 6 decimal places such as </a:t>
-            </a:r>
-            <a:r>
-              <a:rPr kumimoji="1" lang="en-US" altLang="ja-JP" sz="2000" b="1" dirty="0">
-                <a:solidFill>
-                  <a:schemeClr val="accent5">
-                    <a:lumMod val="75000"/>
-                  </a:schemeClr>
-                </a:solidFill>
-              </a:rPr>
-              <a:t>10/33-. 00303%</a:t>
-            </a:r>
-            <a:r>
-              <a:rPr kumimoji="1" lang="en-US" altLang="ja-JP" sz="2000" dirty="0">
-                <a:solidFill>
-                  <a:schemeClr val="accent5">
-                    <a:lumMod val="75000"/>
-                  </a:schemeClr>
-                </a:solidFill>
-              </a:rPr>
-              <a:t> </a:t>
-            </a:r>
-            <a:r>
-              <a:rPr kumimoji="1" lang="en-US" altLang="ja-JP" sz="2000" dirty="0"/>
-              <a:t>for a proportion</a:t>
-            </a:r>
-            <a:r>
-              <a:rPr kumimoji="1" lang="en-US" altLang="ja-JP" sz="2000" dirty="0">
-                <a:solidFill>
-                  <a:srgbClr val="0432FF"/>
-                </a:solidFill>
-              </a:rPr>
-              <a:t> 0.303</a:t>
-            </a:r>
-            <a:br>
-              <a:rPr kumimoji="1" lang="en-US" altLang="ja-JP" sz="2000" dirty="0">
-                <a:solidFill>
-                  <a:srgbClr val="0432FF"/>
-                </a:solidFill>
-              </a:rPr>
-            </a:br>
+              <a:t> : getting 10 candidates from the 123 in descending order.</a:t>
+            </a:r>
+          </a:p>
+          <a:p>
             <a:endParaRPr kumimoji="1" lang="en-US" altLang="ja-JP" sz="2000" dirty="0">
               <a:solidFill>
                 <a:srgbClr val="0432FF"/>
@@ -5564,223 +5431,180 @@
           </a:p>
           <a:p>
             <a:r>
-              <a:rPr lang="en-US" altLang="ja-JP" sz="2000" b="1" dirty="0">
+              <a:rPr kumimoji="1" lang="en-US" altLang="ja-JP" sz="2000" dirty="0">
                 <a:solidFill>
                   <a:srgbClr val="0432FF"/>
                 </a:solidFill>
               </a:rPr>
-              <a:t>-I</a:t>
-            </a:r>
-            <a:r>
-              <a:rPr lang="en-US" altLang="ja-JP" sz="2000" dirty="0"/>
-              <a:t> : showing the interval of possible numerators on </a:t>
-            </a:r>
-            <a:r>
-              <a:rPr lang="en-US" altLang="ja-JP" sz="1800" b="0" i="0" dirty="0" err="1">
-                <a:solidFill>
-                  <a:srgbClr val="202122"/>
-                </a:solidFill>
-                <a:effectLst/>
-                <a:latin typeface="TITUS Cyberbit Basic"/>
-              </a:rPr>
-              <a:t>ℝ</a:t>
-            </a:r>
-            <a:r>
-              <a:rPr lang="en-US" altLang="ja-JP" sz="2000" b="0" i="0" dirty="0">
-                <a:solidFill>
-                  <a:srgbClr val="202122"/>
-                </a:solidFill>
-                <a:effectLst/>
-                <a:latin typeface="TITUS Cyberbit Basic"/>
-              </a:rPr>
-              <a:t>, </a:t>
-            </a:r>
-            <a:r>
-              <a:rPr lang="en-US" altLang="ja-JP" sz="2000" dirty="0"/>
-              <a:t> not only </a:t>
-            </a:r>
-            <a:r>
-              <a:rPr lang="en-US" altLang="ja-JP" sz="2000" b="0" i="0" dirty="0" err="1">
-                <a:solidFill>
-                  <a:srgbClr val="202122"/>
-                </a:solidFill>
-                <a:effectLst/>
-                <a:latin typeface="TITUS Cyberbit Basic"/>
-              </a:rPr>
-              <a:t>ℤ</a:t>
-            </a:r>
-            <a:r>
-              <a:rPr lang="en-US" altLang="ja-JP" sz="1400" b="0" i="0" dirty="0">
-                <a:solidFill>
-                  <a:srgbClr val="202122"/>
-                </a:solidFill>
-                <a:effectLst/>
-                <a:latin typeface="TITUS Cyberbit Basic"/>
-              </a:rPr>
-              <a:t>.</a:t>
-            </a:r>
-            <a:br>
-              <a:rPr lang="en-US" altLang="ja-JP" sz="1400" b="0" i="0" dirty="0">
-                <a:solidFill>
-                  <a:srgbClr val="202122"/>
-                </a:solidFill>
-                <a:effectLst/>
-                <a:latin typeface="TITUS Cyberbit Basic"/>
-              </a:rPr>
-            </a:br>
-            <a:r>
-              <a:rPr lang="en-US" altLang="ja-JP" sz="1400" b="0" i="0" dirty="0">
-                <a:solidFill>
-                  <a:srgbClr val="202122"/>
-                </a:solidFill>
-                <a:effectLst/>
-                <a:latin typeface="TITUS Cyberbit Basic"/>
-              </a:rPr>
-              <a:t>          </a:t>
-            </a:r>
-            <a:r>
-              <a:rPr lang="en-US" altLang="ja-JP" sz="2000" dirty="0">
-                <a:solidFill>
-                  <a:srgbClr val="202122"/>
-                </a:solidFill>
-                <a:latin typeface="TITUS Cyberbit Basic"/>
-              </a:rPr>
-              <a:t>If the interval contains any integer it is shown in green color.</a:t>
-            </a:r>
-          </a:p>
-          <a:p>
+              <a:t>-y .. </a:t>
+            </a:r>
+            <a:r>
+              <a:rPr kumimoji="1" lang="en-US" altLang="ja-JP" sz="2000" dirty="0"/>
+              <a:t>: showing </a:t>
+            </a:r>
+            <a:r>
+              <a:rPr kumimoji="1" lang="en-US" altLang="ja-JP" sz="2000" b="1" dirty="0"/>
+              <a:t>every denominator</a:t>
+            </a:r>
+            <a:r>
+              <a:rPr kumimoji="1" lang="en-US" altLang="ja-JP" sz="2000" dirty="0"/>
+              <a:t> as long as specified by </a:t>
+            </a:r>
             <a:r>
               <a:rPr kumimoji="1" lang="en-US" altLang="ja-JP" sz="2000" b="1" dirty="0">
                 <a:solidFill>
                   <a:srgbClr val="0432FF"/>
                 </a:solidFill>
               </a:rPr>
-              <a:t>-Q</a:t>
+              <a:t>–g </a:t>
             </a:r>
             <a:r>
               <a:rPr kumimoji="1" lang="en-US" altLang="ja-JP" sz="2000" dirty="0"/>
-              <a:t> : showing the numerators in a simplest way.  </a:t>
+              <a:t>option.</a:t>
+            </a:r>
+          </a:p>
+          <a:p>
+            <a:r>
+              <a:rPr kumimoji="1" lang="en-US" altLang="ja-JP" sz="2000" dirty="0">
+                <a:solidFill>
+                  <a:srgbClr val="0432FF"/>
+                </a:solidFill>
+              </a:rPr>
+              <a:t>-y ,</a:t>
+            </a:r>
+            <a:r>
+              <a:rPr kumimoji="1" lang="en-US" altLang="ja-JP" sz="2000" dirty="0"/>
+              <a:t>  : only showing the denominators when </a:t>
+            </a:r>
+            <a:r>
+              <a:rPr kumimoji="1" lang="en-US" altLang="ja-JP" sz="2000" b="1" dirty="0"/>
+              <a:t>every given proportion</a:t>
             </a:r>
             <a:br>
               <a:rPr kumimoji="1" lang="en-US" altLang="ja-JP" sz="2000" dirty="0"/>
             </a:br>
             <a:r>
               <a:rPr kumimoji="1" lang="en-US" altLang="ja-JP" sz="2000" dirty="0"/>
-              <a:t>         Extra1. </a:t>
-            </a:r>
-            <a:r>
-              <a:rPr lang="en-US" altLang="ja-JP" sz="2000" dirty="0"/>
-              <a:t>When only one proportion is given, </a:t>
-            </a:r>
-            <a:br>
-              <a:rPr lang="en-US" altLang="ja-JP" sz="2000" dirty="0"/>
-            </a:br>
-            <a:r>
-              <a:rPr lang="en-US" altLang="ja-JP" sz="2000" dirty="0"/>
-              <a:t>                    the denominator is shown with its prime factorization as well.</a:t>
-            </a:r>
-            <a:br>
-              <a:rPr lang="en-US" altLang="ja-JP" sz="2000" dirty="0"/>
-            </a:br>
-            <a:r>
-              <a:rPr lang="en-US" altLang="ja-JP" sz="2000" dirty="0"/>
-              <a:t>        </a:t>
+              <a:t>           </a:t>
+            </a:r>
+            <a:r>
+              <a:rPr kumimoji="1" lang="en-US" altLang="ja-JP" sz="2000" u="sng" dirty="0"/>
+              <a:t>has at least one corresponding integer numerator</a:t>
             </a:r>
             <a:r>
               <a:rPr kumimoji="1" lang="en-US" altLang="ja-JP" sz="2000" dirty="0"/>
-              <a:t> Extra2. To see all the numerators are odd (2q+1) or even (2q),</a:t>
+              <a:t>.</a:t>
+            </a:r>
+          </a:p>
+          <a:p>
+            <a:r>
+              <a:rPr kumimoji="1" lang="en-US" altLang="ja-JP" sz="2000" dirty="0">
+                <a:solidFill>
+                  <a:srgbClr val="0432FF"/>
+                </a:solidFill>
+              </a:rPr>
+              <a:t>-y 1..</a:t>
+            </a:r>
+            <a:r>
+              <a:rPr kumimoji="1" lang="en-US" altLang="ja-JP" sz="2000" dirty="0"/>
+              <a:t>  : showing the denominators when at least one of given proportion</a:t>
             </a:r>
             <a:br>
               <a:rPr kumimoji="1" lang="en-US" altLang="ja-JP" sz="2000" dirty="0"/>
             </a:br>
             <a:r>
               <a:rPr kumimoji="1" lang="en-US" altLang="ja-JP" sz="2000" dirty="0"/>
-              <a:t>                     if they have a common reminder R against a devisor D,</a:t>
+              <a:t>                 has the corresponding integer numerator. (</a:t>
+            </a:r>
+            <a:r>
+              <a:rPr kumimoji="1" lang="en-US" altLang="ja-JP" sz="2000" b="1" dirty="0"/>
+              <a:t>Default</a:t>
+            </a:r>
+            <a:r>
+              <a:rPr kumimoji="1" lang="en-US" altLang="ja-JP" sz="2000" dirty="0"/>
+              <a:t>)</a:t>
+            </a:r>
+          </a:p>
+          <a:p>
+            <a:r>
+              <a:rPr kumimoji="1" lang="en-US" altLang="ja-JP" sz="2000" dirty="0">
+                <a:solidFill>
+                  <a:srgbClr val="0432FF"/>
+                </a:solidFill>
+              </a:rPr>
+              <a:t>-y -2..</a:t>
+            </a:r>
+            <a:r>
+              <a:rPr kumimoji="1" lang="en-US" altLang="ja-JP" sz="2000" dirty="0"/>
+              <a:t>  : showing the denominators when every given proportion</a:t>
             </a:r>
             <a:br>
               <a:rPr kumimoji="1" lang="en-US" altLang="ja-JP" sz="2000" dirty="0"/>
             </a:br>
             <a:r>
               <a:rPr kumimoji="1" lang="en-US" altLang="ja-JP" sz="2000" dirty="0"/>
-              <a:t>                      they are shown with a form “(</a:t>
-            </a:r>
-            <a:r>
-              <a:rPr kumimoji="1" lang="en-US" altLang="ja-JP" sz="2000" dirty="0" err="1"/>
-              <a:t>Dq+R</a:t>
-            </a:r>
-            <a:r>
+              <a:t>                 has the corresponding integer numerator </a:t>
+            </a:r>
+            <a:br>
               <a:rPr kumimoji="1" lang="en-US" altLang="ja-JP" sz="2000" dirty="0"/>
-              <a:t>)” as well.</a:t>
-            </a:r>
-            <a:br>
-              <a:rPr lang="en-US" altLang="ja-JP" sz="2000" dirty="0"/>
             </a:br>
-            <a:endParaRPr kumimoji="1" lang="en-US" altLang="ja-JP" sz="2000" dirty="0"/>
+            <a:r>
+              <a:rPr kumimoji="1" lang="en-US" altLang="ja-JP" sz="2000" dirty="0"/>
+              <a:t>                   allowing the </a:t>
+            </a:r>
+            <a:r>
+              <a:rPr kumimoji="1" lang="en-US" altLang="ja-JP" sz="2000" b="1" dirty="0"/>
+              <a:t>exceptions</a:t>
+            </a:r>
+            <a:r>
+              <a:rPr kumimoji="1" lang="en-US" altLang="ja-JP" sz="2000" dirty="0"/>
+              <a:t> within 2 of the proportions.</a:t>
+            </a:r>
           </a:p>
           <a:p>
             <a:pPr marL="0" indent="0">
               <a:buNone/>
             </a:pPr>
             <a:r>
-              <a:rPr lang="en-US" altLang="ja-JP" sz="1900" dirty="0"/>
-              <a:t>※</a:t>
-            </a:r>
-            <a:r>
-              <a:rPr lang="ja-JP" altLang="en-US" sz="1900"/>
-              <a:t> </a:t>
-            </a:r>
-            <a:r>
-              <a:rPr kumimoji="1" lang="en-US" altLang="ja-JP" sz="2000" dirty="0"/>
-              <a:t>If </a:t>
-            </a:r>
-            <a:r>
-              <a:rPr kumimoji="1" lang="en-US" altLang="ja-JP" sz="2000" b="1" dirty="0">
+              <a:rPr lang="en-US" altLang="ja-JP" sz="2000" dirty="0">
                 <a:solidFill>
                   <a:srgbClr val="0432FF"/>
                 </a:solidFill>
               </a:rPr>
-              <a:t>–D</a:t>
-            </a:r>
-            <a:r>
-              <a:rPr kumimoji="1" lang="en-US" altLang="ja-JP" sz="2000" dirty="0"/>
-              <a:t> , </a:t>
-            </a:r>
-            <a:r>
-              <a:rPr kumimoji="1" lang="en-US" altLang="ja-JP" sz="2000" b="1" dirty="0">
+              <a:t>N..M</a:t>
+            </a:r>
+            <a:r>
+              <a:rPr lang="en-US" altLang="ja-JP" sz="2000" dirty="0"/>
+              <a:t> means the numerical range. </a:t>
+            </a:r>
+            <a:r>
+              <a:rPr lang="en-US" altLang="ja-JP" sz="2000" dirty="0">
                 <a:solidFill>
                   <a:srgbClr val="0432FF"/>
                 </a:solidFill>
               </a:rPr>
-              <a:t>–I</a:t>
-            </a:r>
-            <a:r>
-              <a:rPr kumimoji="1" lang="en-US" altLang="ja-JP" sz="2000" dirty="0"/>
-              <a:t> and </a:t>
-            </a:r>
-            <a:r>
-              <a:rPr kumimoji="1" lang="en-US" altLang="ja-JP" sz="2000" b="1" dirty="0">
+              <a:t>N..</a:t>
+            </a:r>
+            <a:r>
+              <a:rPr lang="en-US" altLang="ja-JP" sz="2000" dirty="0"/>
+              <a:t> means n to the maximum. </a:t>
+            </a:r>
+            <a:r>
+              <a:rPr lang="en-US" altLang="ja-JP" sz="2000" dirty="0">
                 <a:solidFill>
                   <a:srgbClr val="0432FF"/>
                 </a:solidFill>
               </a:rPr>
-              <a:t>–Q</a:t>
-            </a:r>
-            <a:r>
-              <a:rPr kumimoji="1" lang="en-US" altLang="ja-JP" sz="2000" dirty="0"/>
-              <a:t> are not given, </a:t>
-            </a:r>
-            <a:r>
-              <a:rPr kumimoji="1" lang="en-US" altLang="ja-JP" sz="2000" b="1" dirty="0">
-                <a:solidFill>
-                  <a:srgbClr val="0432FF"/>
-                </a:solidFill>
-              </a:rPr>
-              <a:t>-D0</a:t>
-            </a:r>
-            <a:r>
-              <a:rPr kumimoji="1" lang="en-US" altLang="ja-JP" sz="2000" dirty="0"/>
-              <a:t> is regarded to be specified internally.</a:t>
-            </a:r>
+              <a:t>..M</a:t>
+            </a:r>
+            <a:r>
+              <a:rPr lang="en-US" altLang="ja-JP" sz="2000" dirty="0"/>
+              <a:t> means zero to M. When N or M is negative, it means (the maximum)-abs(N or M). Those types of range or a single number can be combined by comma(,).</a:t>
+            </a:r>
+            <a:endParaRPr kumimoji="1" lang="en-US" altLang="ja-JP" sz="2000" dirty="0"/>
+          </a:p>
+          <a:p>
+            <a:endParaRPr kumimoji="1" lang="ja-JP" altLang="en-US" sz="2000"/>
           </a:p>
         </p:txBody>
       </p:sp>
@@ -5808,6 +5632,553 @@
             <a:fld id="{63C814F0-333B-8D45-B387-98F69425B688}" type="slidenum">
               <a:rPr kumimoji="1" lang="ja-JP" altLang="en-US" smtClean="0"/>
               <a:t>14</a:t>
+            </a:fld>
+            <a:endParaRPr kumimoji="1" lang="ja-JP" altLang="en-US"/>
+          </a:p>
+        </p:txBody>
+      </p:sp>
+    </p:spTree>
+    <p:extLst>
+      <p:ext uri="{BB962C8B-B14F-4D97-AF65-F5344CB8AC3E}">
+        <p14:creationId xmlns:p14="http://schemas.microsoft.com/office/powerpoint/2010/main" val="2125685854"/>
+      </p:ext>
+    </p:extLst>
+  </p:cSld>
+  <p:clrMapOvr>
+    <a:masterClrMapping/>
+  </p:clrMapOvr>
+</p:sld>
+</file>
+
+<file path=ppt/slides/slide15.xml><?xml version="1.0" encoding="utf-8"?>
+<p:sld xmlns:a="http://schemas.openxmlformats.org/drawingml/2006/main" xmlns:r="http://schemas.openxmlformats.org/officeDocument/2006/relationships" xmlns:p="http://schemas.openxmlformats.org/presentationml/2006/main">
+  <p:cSld>
+    <p:spTree>
+      <p:nvGrpSpPr>
+        <p:cNvPr id="1" name=""/>
+        <p:cNvGrpSpPr/>
+        <p:nvPr/>
+      </p:nvGrpSpPr>
+      <p:grpSpPr>
+        <a:xfrm>
+          <a:off x="0" y="0"/>
+          <a:ext cx="0" cy="0"/>
+          <a:chOff x="0" y="0"/>
+          <a:chExt cx="0" cy="0"/>
+        </a:xfrm>
+      </p:grpSpPr>
+      <p:sp>
+        <p:nvSpPr>
+          <p:cNvPr id="2" name="タイトル 1">
+            <a:extLst>
+              <a:ext uri="{FF2B5EF4-FFF2-40B4-BE49-F238E27FC236}">
+                <a16:creationId xmlns:a16="http://schemas.microsoft.com/office/drawing/2014/main" id="{D6C10A47-1CBC-AF40-F2E8-ABF5F56F77D2}"/>
+              </a:ext>
+            </a:extLst>
+          </p:cNvPr>
+          <p:cNvSpPr>
+            <a:spLocks noGrp="1"/>
+          </p:cNvSpPr>
+          <p:nvPr>
+            <p:ph type="title"/>
+          </p:nvPr>
+        </p:nvSpPr>
+        <p:spPr>
+          <a:xfrm>
+            <a:off x="628650" y="365126"/>
+            <a:ext cx="7886700" cy="315911"/>
+          </a:xfrm>
+        </p:spPr>
+        <p:txBody>
+          <a:bodyPr>
+            <a:normAutofit fontScale="90000"/>
+          </a:bodyPr>
+          <a:lstStyle/>
+          <a:p>
+            <a:r>
+              <a:rPr kumimoji="1" lang="en-US" altLang="ja-JP" dirty="0"/>
+              <a:t>Options in output</a:t>
+            </a:r>
+            <a:endParaRPr kumimoji="1" lang="ja-JP" altLang="en-US"/>
+          </a:p>
+        </p:txBody>
+      </p:sp>
+      <p:sp>
+        <p:nvSpPr>
+          <p:cNvPr id="3" name="コンテンツ プレースホルダー 2">
+            <a:extLst>
+              <a:ext uri="{FF2B5EF4-FFF2-40B4-BE49-F238E27FC236}">
+                <a16:creationId xmlns:a16="http://schemas.microsoft.com/office/drawing/2014/main" id="{C81BD508-E147-CF3C-1307-85ED77A84112}"/>
+              </a:ext>
+            </a:extLst>
+          </p:cNvPr>
+          <p:cNvSpPr>
+            <a:spLocks noGrp="1"/>
+          </p:cNvSpPr>
+          <p:nvPr>
+            <p:ph idx="1"/>
+          </p:nvPr>
+        </p:nvSpPr>
+        <p:spPr>
+          <a:xfrm>
+            <a:off x="628650" y="906449"/>
+            <a:ext cx="7886700" cy="5270514"/>
+          </a:xfrm>
+        </p:spPr>
+        <p:txBody>
+          <a:bodyPr>
+            <a:normAutofit fontScale="92500" lnSpcReduction="10000"/>
+          </a:bodyPr>
+          <a:lstStyle/>
+          <a:p>
+            <a:r>
+              <a:rPr kumimoji="1" lang="en-US" altLang="ja-JP" sz="2000" dirty="0">
+                <a:solidFill>
+                  <a:srgbClr val="0432FF"/>
+                </a:solidFill>
+              </a:rPr>
+              <a:t>-D0 </a:t>
+            </a:r>
+            <a:r>
+              <a:rPr kumimoji="1" lang="en-US" altLang="ja-JP" sz="2000" dirty="0"/>
+              <a:t>: showing the fraction form such as </a:t>
+            </a:r>
+            <a:r>
+              <a:rPr kumimoji="1" lang="en-US" altLang="ja-JP" sz="2000" b="1" dirty="0">
+                <a:solidFill>
+                  <a:schemeClr val="accent5">
+                    <a:lumMod val="75000"/>
+                  </a:schemeClr>
+                </a:solidFill>
+              </a:rPr>
+              <a:t>10/33</a:t>
+            </a:r>
+            <a:r>
+              <a:rPr kumimoji="1" lang="en-US" altLang="ja-JP" sz="2000" dirty="0"/>
+              <a:t>. (</a:t>
+            </a:r>
+            <a:r>
+              <a:rPr kumimoji="1" lang="en-US" altLang="ja-JP" sz="2000" b="1" dirty="0"/>
+              <a:t>Default</a:t>
+            </a:r>
+            <a:r>
+              <a:rPr kumimoji="1" lang="en-US" altLang="ja-JP" sz="2000" dirty="0"/>
+              <a:t> </a:t>
+            </a:r>
+            <a:r>
+              <a:rPr lang="en-US" altLang="ja-JP" sz="1800" dirty="0"/>
+              <a:t>※</a:t>
+            </a:r>
+            <a:r>
+              <a:rPr kumimoji="1" lang="en-US" altLang="ja-JP" sz="2000" dirty="0"/>
+              <a:t>)</a:t>
+            </a:r>
+          </a:p>
+          <a:p>
+            <a:r>
+              <a:rPr kumimoji="1" lang="en-US" altLang="ja-JP" sz="2000" dirty="0">
+                <a:solidFill>
+                  <a:srgbClr val="0432FF"/>
+                </a:solidFill>
+              </a:rPr>
+              <a:t>-D3</a:t>
+            </a:r>
+            <a:r>
+              <a:rPr kumimoji="1" lang="en-US" altLang="ja-JP" sz="2000" dirty="0"/>
+              <a:t> : showing also with 3 decimal places such as </a:t>
+            </a:r>
+            <a:r>
+              <a:rPr kumimoji="1" lang="en-US" altLang="ja-JP" sz="2000" b="1" dirty="0">
+                <a:solidFill>
+                  <a:schemeClr val="accent5">
+                    <a:lumMod val="75000"/>
+                  </a:schemeClr>
+                </a:solidFill>
+              </a:rPr>
+              <a:t>10/33=.303</a:t>
+            </a:r>
+          </a:p>
+          <a:p>
+            <a:r>
+              <a:rPr kumimoji="1" lang="en-US" altLang="ja-JP" sz="2000" dirty="0">
+                <a:solidFill>
+                  <a:srgbClr val="0432FF"/>
+                </a:solidFill>
+              </a:rPr>
+              <a:t>-D4%</a:t>
+            </a:r>
+            <a:r>
+              <a:rPr kumimoji="1" lang="en-US" altLang="ja-JP" sz="2000" dirty="0"/>
+              <a:t> : in 4 decimal places in percentage such as </a:t>
+            </a:r>
+            <a:r>
+              <a:rPr kumimoji="1" lang="en-US" altLang="ja-JP" sz="2000" b="1" dirty="0">
+                <a:solidFill>
+                  <a:schemeClr val="accent5">
+                    <a:lumMod val="75000"/>
+                  </a:schemeClr>
+                </a:solidFill>
+              </a:rPr>
+              <a:t>10/33=30.3030%</a:t>
+            </a:r>
+          </a:p>
+          <a:p>
+            <a:r>
+              <a:rPr kumimoji="1" lang="en-US" altLang="ja-JP" sz="2000" dirty="0">
+                <a:solidFill>
+                  <a:srgbClr val="0432FF"/>
+                </a:solidFill>
+              </a:rPr>
+              <a:t>-D-5</a:t>
+            </a:r>
+            <a:r>
+              <a:rPr kumimoji="1" lang="en-US" altLang="ja-JP" sz="2000" dirty="0"/>
+              <a:t> : showing the difference to realize the given proportion with 5 decimal places </a:t>
+            </a:r>
+            <a:r>
+              <a:rPr kumimoji="1" lang="en-US" altLang="ja-JP" sz="2000" b="1" dirty="0">
+                <a:solidFill>
+                  <a:schemeClr val="accent5">
+                    <a:lumMod val="75000"/>
+                  </a:schemeClr>
+                </a:solidFill>
+              </a:rPr>
+              <a:t>10/33-.00003</a:t>
+            </a:r>
+            <a:r>
+              <a:rPr kumimoji="1" lang="en-US" altLang="ja-JP" sz="2000" dirty="0">
+                <a:solidFill>
+                  <a:schemeClr val="accent5">
+                    <a:lumMod val="75000"/>
+                  </a:schemeClr>
+                </a:solidFill>
+              </a:rPr>
+              <a:t> </a:t>
+            </a:r>
+            <a:r>
+              <a:rPr kumimoji="1" lang="en-US" altLang="ja-JP" sz="2000" dirty="0"/>
+              <a:t>for a given proportion</a:t>
+            </a:r>
+            <a:r>
+              <a:rPr kumimoji="1" lang="en-US" altLang="ja-JP" sz="2000" dirty="0">
+                <a:solidFill>
+                  <a:srgbClr val="0432FF"/>
+                </a:solidFill>
+              </a:rPr>
+              <a:t> 0.303</a:t>
+            </a:r>
+          </a:p>
+          <a:p>
+            <a:r>
+              <a:rPr kumimoji="1" lang="en-US" altLang="ja-JP" sz="2000" dirty="0">
+                <a:solidFill>
+                  <a:srgbClr val="0432FF"/>
+                </a:solidFill>
+              </a:rPr>
+              <a:t>-D-6%</a:t>
+            </a:r>
+            <a:r>
+              <a:rPr kumimoji="1" lang="en-US" altLang="ja-JP" sz="2000" dirty="0"/>
+              <a:t> : showing the difference to realize the given proportion </a:t>
+            </a:r>
+            <a:br>
+              <a:rPr kumimoji="1" lang="en-US" altLang="ja-JP" sz="2000" dirty="0"/>
+            </a:br>
+            <a:r>
+              <a:rPr kumimoji="1" lang="en-US" altLang="ja-JP" sz="2000" dirty="0"/>
+              <a:t>  with 6 decimal places such as </a:t>
+            </a:r>
+            <a:r>
+              <a:rPr kumimoji="1" lang="en-US" altLang="ja-JP" sz="2000" b="1" dirty="0">
+                <a:solidFill>
+                  <a:schemeClr val="accent5">
+                    <a:lumMod val="75000"/>
+                  </a:schemeClr>
+                </a:solidFill>
+              </a:rPr>
+              <a:t>10/33-. 00303%</a:t>
+            </a:r>
+            <a:r>
+              <a:rPr kumimoji="1" lang="en-US" altLang="ja-JP" sz="2000" dirty="0">
+                <a:solidFill>
+                  <a:schemeClr val="accent5">
+                    <a:lumMod val="75000"/>
+                  </a:schemeClr>
+                </a:solidFill>
+              </a:rPr>
+              <a:t> </a:t>
+            </a:r>
+            <a:r>
+              <a:rPr kumimoji="1" lang="en-US" altLang="ja-JP" sz="2000" dirty="0"/>
+              <a:t>for a proportion</a:t>
+            </a:r>
+            <a:r>
+              <a:rPr kumimoji="1" lang="en-US" altLang="ja-JP" sz="2000" dirty="0">
+                <a:solidFill>
+                  <a:srgbClr val="0432FF"/>
+                </a:solidFill>
+              </a:rPr>
+              <a:t> 0.303</a:t>
+            </a:r>
+            <a:br>
+              <a:rPr kumimoji="1" lang="en-US" altLang="ja-JP" sz="2000" dirty="0">
+                <a:solidFill>
+                  <a:srgbClr val="0432FF"/>
+                </a:solidFill>
+              </a:rPr>
+            </a:br>
+            <a:endParaRPr kumimoji="1" lang="en-US" altLang="ja-JP" sz="2000" dirty="0">
+              <a:solidFill>
+                <a:srgbClr val="0432FF"/>
+              </a:solidFill>
+            </a:endParaRPr>
+          </a:p>
+          <a:p>
+            <a:r>
+              <a:rPr lang="en-US" altLang="ja-JP" sz="2000" b="1" dirty="0">
+                <a:solidFill>
+                  <a:srgbClr val="0432FF"/>
+                </a:solidFill>
+              </a:rPr>
+              <a:t>-I</a:t>
+            </a:r>
+            <a:r>
+              <a:rPr lang="en-US" altLang="ja-JP" sz="2000" dirty="0"/>
+              <a:t> : showing the interval of possible numerators on </a:t>
+            </a:r>
+            <a:r>
+              <a:rPr lang="en-US" altLang="ja-JP" sz="1800" b="0" i="0" dirty="0" err="1">
+                <a:solidFill>
+                  <a:srgbClr val="202122"/>
+                </a:solidFill>
+                <a:effectLst/>
+                <a:latin typeface="TITUS Cyberbit Basic"/>
+              </a:rPr>
+              <a:t>ℝ</a:t>
+            </a:r>
+            <a:r>
+              <a:rPr lang="en-US" altLang="ja-JP" sz="2000" b="0" i="0" dirty="0">
+                <a:solidFill>
+                  <a:srgbClr val="202122"/>
+                </a:solidFill>
+                <a:effectLst/>
+                <a:latin typeface="TITUS Cyberbit Basic"/>
+              </a:rPr>
+              <a:t>, </a:t>
+            </a:r>
+            <a:r>
+              <a:rPr lang="en-US" altLang="ja-JP" sz="2000" dirty="0"/>
+              <a:t> not only </a:t>
+            </a:r>
+            <a:r>
+              <a:rPr lang="en-US" altLang="ja-JP" sz="2000" b="0" i="0" dirty="0" err="1">
+                <a:solidFill>
+                  <a:srgbClr val="202122"/>
+                </a:solidFill>
+                <a:effectLst/>
+                <a:latin typeface="TITUS Cyberbit Basic"/>
+              </a:rPr>
+              <a:t>ℤ</a:t>
+            </a:r>
+            <a:r>
+              <a:rPr lang="en-US" altLang="ja-JP" sz="1400" b="0" i="0" dirty="0">
+                <a:solidFill>
+                  <a:srgbClr val="202122"/>
+                </a:solidFill>
+                <a:effectLst/>
+                <a:latin typeface="TITUS Cyberbit Basic"/>
+              </a:rPr>
+              <a:t>.</a:t>
+            </a:r>
+            <a:br>
+              <a:rPr lang="en-US" altLang="ja-JP" sz="1400" b="0" i="0" dirty="0">
+                <a:solidFill>
+                  <a:srgbClr val="202122"/>
+                </a:solidFill>
+                <a:effectLst/>
+                <a:latin typeface="TITUS Cyberbit Basic"/>
+              </a:rPr>
+            </a:br>
+            <a:r>
+              <a:rPr lang="en-US" altLang="ja-JP" sz="1400" b="0" i="0" dirty="0">
+                <a:solidFill>
+                  <a:srgbClr val="202122"/>
+                </a:solidFill>
+                <a:effectLst/>
+                <a:latin typeface="TITUS Cyberbit Basic"/>
+              </a:rPr>
+              <a:t>          </a:t>
+            </a:r>
+            <a:r>
+              <a:rPr lang="en-US" altLang="ja-JP" sz="2000" dirty="0">
+                <a:solidFill>
+                  <a:srgbClr val="202122"/>
+                </a:solidFill>
+                <a:latin typeface="TITUS Cyberbit Basic"/>
+              </a:rPr>
+              <a:t>If the interval contains any integer it is shown in green color.</a:t>
+            </a:r>
+          </a:p>
+          <a:p>
+            <a:r>
+              <a:rPr kumimoji="1" lang="en-US" altLang="ja-JP" sz="2000" b="1" dirty="0">
+                <a:solidFill>
+                  <a:srgbClr val="0432FF"/>
+                </a:solidFill>
+              </a:rPr>
+              <a:t>-Q</a:t>
+            </a:r>
+            <a:r>
+              <a:rPr kumimoji="1" lang="en-US" altLang="ja-JP" sz="2000" dirty="0"/>
+              <a:t> : showing the numerators in a simplest way.  </a:t>
+            </a:r>
+            <a:br>
+              <a:rPr kumimoji="1" lang="en-US" altLang="ja-JP" sz="2000" dirty="0"/>
+            </a:br>
+            <a:r>
+              <a:rPr kumimoji="1" lang="en-US" altLang="ja-JP" sz="2000" dirty="0"/>
+              <a:t>         Extra1. </a:t>
+            </a:r>
+            <a:r>
+              <a:rPr lang="en-US" altLang="ja-JP" sz="2000" dirty="0"/>
+              <a:t>When only one proportion is given, </a:t>
+            </a:r>
+            <a:br>
+              <a:rPr lang="en-US" altLang="ja-JP" sz="2000" dirty="0"/>
+            </a:br>
+            <a:r>
+              <a:rPr lang="en-US" altLang="ja-JP" sz="2000" dirty="0"/>
+              <a:t>                    the denominator is shown with its prime factorization as well.</a:t>
+            </a:r>
+            <a:br>
+              <a:rPr lang="en-US" altLang="ja-JP" sz="2000" dirty="0"/>
+            </a:br>
+            <a:r>
+              <a:rPr lang="en-US" altLang="ja-JP" sz="2000" dirty="0"/>
+              <a:t>        </a:t>
+            </a:r>
+            <a:r>
+              <a:rPr kumimoji="1" lang="en-US" altLang="ja-JP" sz="2000" dirty="0"/>
+              <a:t> Extra2. To see all the numerators are odd (2q+1) or even (2q),</a:t>
+            </a:r>
+            <a:br>
+              <a:rPr kumimoji="1" lang="en-US" altLang="ja-JP" sz="2000" dirty="0"/>
+            </a:br>
+            <a:r>
+              <a:rPr kumimoji="1" lang="en-US" altLang="ja-JP" sz="2000" dirty="0"/>
+              <a:t>                     if they have a common reminder R against a devisor D,</a:t>
+            </a:r>
+            <a:br>
+              <a:rPr kumimoji="1" lang="en-US" altLang="ja-JP" sz="2000" dirty="0"/>
+            </a:br>
+            <a:r>
+              <a:rPr kumimoji="1" lang="en-US" altLang="ja-JP" sz="2000" dirty="0"/>
+              <a:t>                      they are shown with a form “(</a:t>
+            </a:r>
+            <a:r>
+              <a:rPr kumimoji="1" lang="en-US" altLang="ja-JP" sz="2000" dirty="0" err="1"/>
+              <a:t>Dq+R</a:t>
+            </a:r>
+            <a:r>
+              <a:rPr kumimoji="1" lang="en-US" altLang="ja-JP" sz="2000" dirty="0"/>
+              <a:t>)” as well.</a:t>
+            </a:r>
+            <a:br>
+              <a:rPr lang="en-US" altLang="ja-JP" sz="2000" dirty="0"/>
+            </a:br>
+            <a:endParaRPr kumimoji="1" lang="en-US" altLang="ja-JP" sz="2000" dirty="0"/>
+          </a:p>
+          <a:p>
+            <a:pPr marL="0" indent="0">
+              <a:buNone/>
+            </a:pPr>
+            <a:r>
+              <a:rPr lang="en-US" altLang="ja-JP" sz="1900" dirty="0"/>
+              <a:t>※</a:t>
+            </a:r>
+            <a:r>
+              <a:rPr lang="ja-JP" altLang="en-US" sz="1900"/>
+              <a:t> </a:t>
+            </a:r>
+            <a:r>
+              <a:rPr kumimoji="1" lang="en-US" altLang="ja-JP" sz="2000" dirty="0"/>
+              <a:t>If </a:t>
+            </a:r>
+            <a:r>
+              <a:rPr kumimoji="1" lang="en-US" altLang="ja-JP" sz="2000" b="1" dirty="0">
+                <a:solidFill>
+                  <a:srgbClr val="0432FF"/>
+                </a:solidFill>
+              </a:rPr>
+              <a:t>–D</a:t>
+            </a:r>
+            <a:r>
+              <a:rPr kumimoji="1" lang="en-US" altLang="ja-JP" sz="2000" dirty="0"/>
+              <a:t> , </a:t>
+            </a:r>
+            <a:r>
+              <a:rPr kumimoji="1" lang="en-US" altLang="ja-JP" sz="2000" b="1" dirty="0">
+                <a:solidFill>
+                  <a:srgbClr val="0432FF"/>
+                </a:solidFill>
+              </a:rPr>
+              <a:t>–I</a:t>
+            </a:r>
+            <a:r>
+              <a:rPr kumimoji="1" lang="en-US" altLang="ja-JP" sz="2000" dirty="0"/>
+              <a:t> and </a:t>
+            </a:r>
+            <a:r>
+              <a:rPr kumimoji="1" lang="en-US" altLang="ja-JP" sz="2000" b="1" dirty="0">
+                <a:solidFill>
+                  <a:srgbClr val="0432FF"/>
+                </a:solidFill>
+              </a:rPr>
+              <a:t>–Q</a:t>
+            </a:r>
+            <a:r>
+              <a:rPr kumimoji="1" lang="en-US" altLang="ja-JP" sz="2000" dirty="0"/>
+              <a:t> are not given, </a:t>
+            </a:r>
+            <a:r>
+              <a:rPr kumimoji="1" lang="en-US" altLang="ja-JP" sz="2000" b="1" dirty="0">
+                <a:solidFill>
+                  <a:srgbClr val="0432FF"/>
+                </a:solidFill>
+              </a:rPr>
+              <a:t>-D0</a:t>
+            </a:r>
+            <a:r>
+              <a:rPr kumimoji="1" lang="en-US" altLang="ja-JP" sz="2000" dirty="0"/>
+              <a:t> is regarded to be specified internally.</a:t>
+            </a:r>
+          </a:p>
+        </p:txBody>
+      </p:sp>
+      <p:sp>
+        <p:nvSpPr>
+          <p:cNvPr id="4" name="スライド番号プレースホルダー 3">
+            <a:extLst>
+              <a:ext uri="{FF2B5EF4-FFF2-40B4-BE49-F238E27FC236}">
+                <a16:creationId xmlns:a16="http://schemas.microsoft.com/office/drawing/2014/main" id="{649F05BB-B3FB-4529-3B29-6C258BEAC413}"/>
+              </a:ext>
+            </a:extLst>
+          </p:cNvPr>
+          <p:cNvSpPr>
+            <a:spLocks noGrp="1"/>
+          </p:cNvSpPr>
+          <p:nvPr>
+            <p:ph type="sldNum" sz="quarter" idx="12"/>
+          </p:nvPr>
+        </p:nvSpPr>
+        <p:spPr/>
+        <p:txBody>
+          <a:bodyPr/>
+          <a:lstStyle/>
+          <a:p>
+            <a:fld id="{63C814F0-333B-8D45-B387-98F69425B688}" type="slidenum">
+              <a:rPr kumimoji="1" lang="ja-JP" altLang="en-US" smtClean="0"/>
+              <a:t>15</a:t>
             </a:fld>
             <a:endParaRPr kumimoji="1" lang="ja-JP" altLang="en-US"/>
           </a:p>

</xml_diff>

<commit_message>
manipulation221022sat.pptx と .pdf : deviative → byproduct
</commit_message>
<xml_diff>
--- a/docs2/manipulation221022sat.pptx
+++ b/docs2/manipulation221022sat.pptx
@@ -4890,7 +4890,23 @@
           <a:p>
             <a:r>
               <a:rPr kumimoji="1" lang="en-US" altLang="ja-JP" dirty="0"/>
-              <a:t>A derivative question :  when the candidates of possible integer denominators are calculated, the minimum value among them is quite often the real value. Why? </a:t>
+              <a:t>A byproduct question :  when the candidates of possible integer denominators are calculated, the </a:t>
+            </a:r>
+            <a:r>
+              <a:rPr kumimoji="1" lang="en-US" altLang="ja-JP" u="sng" dirty="0"/>
+              <a:t>minimum value</a:t>
+            </a:r>
+            <a:r>
+              <a:rPr kumimoji="1" lang="en-US" altLang="ja-JP" dirty="0"/>
+              <a:t> among them is quite often </a:t>
+            </a:r>
+            <a:r>
+              <a:rPr kumimoji="1" lang="en-US" altLang="ja-JP"/>
+              <a:t>the true </a:t>
+            </a:r>
+            <a:r>
+              <a:rPr kumimoji="1" lang="en-US" altLang="ja-JP" dirty="0"/>
+              <a:t>value. Why? </a:t>
             </a:r>
             <a:endParaRPr kumimoji="1" lang="ja-JP" altLang="en-US"/>
           </a:p>

</xml_diff>